<commit_message>
React: Update website content.
</commit_message>
<xml_diff>
--- a/doc/card-images.pptx
+++ b/doc/card-images.pptx
@@ -107,12 +107,12 @@
   <p:extLst>
     <p:ext uri="{EFAFB233-063F-42B5-8137-9DF3F51BA10A}">
       <p15:sldGuideLst xmlns:p15="http://schemas.microsoft.com/office/powerpoint/2012/main">
-        <p15:guide id="1" orient="horz" pos="1684" userDrawn="1">
+        <p15:guide id="1" orient="horz" pos="2001" userDrawn="1">
           <p15:clr>
             <a:srgbClr val="A4A3A4"/>
           </p15:clr>
         </p15:guide>
-        <p15:guide id="2" pos="5768" userDrawn="1">
+        <p15:guide id="2" pos="6312" userDrawn="1">
           <p15:clr>
             <a:srgbClr val="A4A3A4"/>
           </p15:clr>
@@ -3564,49 +3564,6 @@
           <a:ln w="82550">
             <a:solidFill>
               <a:schemeClr val="bg1"/>
-            </a:solidFill>
-          </a:ln>
-        </p:spPr>
-        <p:style>
-          <a:lnRef idx="1">
-            <a:schemeClr val="accent1"/>
-          </a:lnRef>
-          <a:fillRef idx="0">
-            <a:schemeClr val="accent1"/>
-          </a:fillRef>
-          <a:effectRef idx="0">
-            <a:schemeClr val="accent1"/>
-          </a:effectRef>
-          <a:fontRef idx="minor">
-            <a:schemeClr val="tx1"/>
-          </a:fontRef>
-        </p:style>
-      </p:cxnSp>
-      <p:cxnSp>
-        <p:nvCxnSpPr>
-          <p:cNvPr id="206" name="Straight Connector 205">
-            <a:extLst>
-              <a:ext uri="{FF2B5EF4-FFF2-40B4-BE49-F238E27FC236}">
-                <a16:creationId xmlns:a16="http://schemas.microsoft.com/office/drawing/2014/main" id="{2E0C5AF1-99FD-C447-A920-8DC30DFB4C9A}"/>
-              </a:ext>
-            </a:extLst>
-          </p:cNvPr>
-          <p:cNvCxnSpPr>
-            <a:cxnSpLocks/>
-          </p:cNvCxnSpPr>
-          <p:nvPr/>
-        </p:nvCxnSpPr>
-        <p:spPr>
-          <a:xfrm>
-            <a:off x="6367249" y="3708787"/>
-            <a:ext cx="638952" cy="0"/>
-          </a:xfrm>
-          <a:prstGeom prst="line">
-            <a:avLst/>
-          </a:prstGeom>
-          <a:ln w="50800">
-            <a:solidFill>
-              <a:schemeClr val="accent3"/>
             </a:solidFill>
           </a:ln>
         </p:spPr>
@@ -4656,2076 +4613,6 @@
           </p:sp>
         </p:grpSp>
       </p:grpSp>
-      <p:sp>
-        <p:nvSpPr>
-          <p:cNvPr id="102" name="Rectangle 101">
-            <a:extLst>
-              <a:ext uri="{FF2B5EF4-FFF2-40B4-BE49-F238E27FC236}">
-                <a16:creationId xmlns:a16="http://schemas.microsoft.com/office/drawing/2014/main" id="{73EE7F84-13DD-B44E-93EE-B6C48937A160}"/>
-              </a:ext>
-            </a:extLst>
-          </p:cNvPr>
-          <p:cNvSpPr/>
-          <p:nvPr/>
-        </p:nvSpPr>
-        <p:spPr>
-          <a:xfrm>
-            <a:off x="5207553" y="776746"/>
-            <a:ext cx="3600000" cy="1800000"/>
-          </a:xfrm>
-          <a:prstGeom prst="rect">
-            <a:avLst/>
-          </a:prstGeom>
-          <a:solidFill>
-            <a:schemeClr val="bg1">
-              <a:lumMod val="85000"/>
-            </a:schemeClr>
-          </a:solidFill>
-          <a:ln w="3175"/>
-        </p:spPr>
-        <p:style>
-          <a:lnRef idx="2">
-            <a:schemeClr val="accent1">
-              <a:shade val="50000"/>
-            </a:schemeClr>
-          </a:lnRef>
-          <a:fillRef idx="1">
-            <a:schemeClr val="accent1"/>
-          </a:fillRef>
-          <a:effectRef idx="0">
-            <a:schemeClr val="accent1"/>
-          </a:effectRef>
-          <a:fontRef idx="minor">
-            <a:schemeClr val="lt1"/>
-          </a:fontRef>
-        </p:style>
-        <p:txBody>
-          <a:bodyPr rtlCol="0" anchor="ctr"/>
-          <a:lstStyle/>
-          <a:p>
-            <a:pPr algn="ctr"/>
-            <a:endParaRPr lang="en-CH" dirty="0"/>
-          </a:p>
-        </p:txBody>
-      </p:sp>
-      <p:grpSp>
-        <p:nvGrpSpPr>
-          <p:cNvPr id="158" name="Group 157">
-            <a:extLst>
-              <a:ext uri="{FF2B5EF4-FFF2-40B4-BE49-F238E27FC236}">
-                <a16:creationId xmlns:a16="http://schemas.microsoft.com/office/drawing/2014/main" id="{038FE454-E2B5-3D4B-89E2-DA074032BDE3}"/>
-              </a:ext>
-            </a:extLst>
-          </p:cNvPr>
-          <p:cNvGrpSpPr/>
-          <p:nvPr/>
-        </p:nvGrpSpPr>
-        <p:grpSpPr>
-          <a:xfrm>
-            <a:off x="5444493" y="971065"/>
-            <a:ext cx="3126120" cy="1449463"/>
-            <a:chOff x="5544736" y="1012002"/>
-            <a:chExt cx="3126120" cy="1449463"/>
-          </a:xfrm>
-        </p:grpSpPr>
-        <p:grpSp>
-          <p:nvGrpSpPr>
-            <p:cNvPr id="114" name="Group 113">
-              <a:extLst>
-                <a:ext uri="{FF2B5EF4-FFF2-40B4-BE49-F238E27FC236}">
-                  <a16:creationId xmlns:a16="http://schemas.microsoft.com/office/drawing/2014/main" id="{7FC59C19-7CDE-9340-B54F-E17D93714361}"/>
-                </a:ext>
-              </a:extLst>
-            </p:cNvPr>
-            <p:cNvGrpSpPr/>
-            <p:nvPr/>
-          </p:nvGrpSpPr>
-          <p:grpSpPr>
-            <a:xfrm rot="2700000">
-              <a:off x="7030806" y="1535219"/>
-              <a:ext cx="314001" cy="314001"/>
-              <a:chOff x="4791793" y="2634521"/>
-              <a:chExt cx="146050" cy="146050"/>
-            </a:xfrm>
-          </p:grpSpPr>
-          <p:sp>
-            <p:nvSpPr>
-              <p:cNvPr id="118" name="Oval 117">
-                <a:extLst>
-                  <a:ext uri="{FF2B5EF4-FFF2-40B4-BE49-F238E27FC236}">
-                    <a16:creationId xmlns:a16="http://schemas.microsoft.com/office/drawing/2014/main" id="{BA4D2C7A-9CAB-B543-8041-74AB9945FC92}"/>
-                  </a:ext>
-                </a:extLst>
-              </p:cNvPr>
-              <p:cNvSpPr/>
-              <p:nvPr/>
-            </p:nvSpPr>
-            <p:spPr>
-              <a:xfrm>
-                <a:off x="4791793" y="2634521"/>
-                <a:ext cx="146050" cy="146050"/>
-              </a:xfrm>
-              <a:prstGeom prst="ellipse">
-                <a:avLst/>
-              </a:prstGeom>
-              <a:solidFill>
-                <a:schemeClr val="bg1"/>
-              </a:solidFill>
-              <a:ln w="28575">
-                <a:solidFill>
-                  <a:srgbClr val="C00000"/>
-                </a:solidFill>
-              </a:ln>
-            </p:spPr>
-            <p:style>
-              <a:lnRef idx="2">
-                <a:schemeClr val="accent1">
-                  <a:shade val="50000"/>
-                </a:schemeClr>
-              </a:lnRef>
-              <a:fillRef idx="1">
-                <a:schemeClr val="accent1"/>
-              </a:fillRef>
-              <a:effectRef idx="0">
-                <a:schemeClr val="accent1"/>
-              </a:effectRef>
-              <a:fontRef idx="minor">
-                <a:schemeClr val="lt1"/>
-              </a:fontRef>
-            </p:style>
-            <p:txBody>
-              <a:bodyPr rtlCol="0" anchor="ctr"/>
-              <a:lstStyle/>
-              <a:p>
-                <a:pPr algn="ctr"/>
-                <a:endParaRPr lang="en-CH"/>
-              </a:p>
-            </p:txBody>
-          </p:sp>
-          <p:sp>
-            <p:nvSpPr>
-              <p:cNvPr id="119" name="Multiply 118">
-                <a:extLst>
-                  <a:ext uri="{FF2B5EF4-FFF2-40B4-BE49-F238E27FC236}">
-                    <a16:creationId xmlns:a16="http://schemas.microsoft.com/office/drawing/2014/main" id="{1DD48712-4F34-8A44-86BC-EAF185C8B049}"/>
-                  </a:ext>
-                </a:extLst>
-              </p:cNvPr>
-              <p:cNvSpPr/>
-              <p:nvPr/>
-            </p:nvSpPr>
-            <p:spPr>
-              <a:xfrm>
-                <a:off x="4803352" y="2646077"/>
-                <a:ext cx="122944" cy="122944"/>
-              </a:xfrm>
-              <a:prstGeom prst="mathMultiply">
-                <a:avLst/>
-              </a:prstGeom>
-              <a:solidFill>
-                <a:srgbClr val="C00000"/>
-              </a:solidFill>
-              <a:ln w="0">
-                <a:solidFill>
-                  <a:srgbClr val="C00000"/>
-                </a:solidFill>
-              </a:ln>
-            </p:spPr>
-            <p:style>
-              <a:lnRef idx="2">
-                <a:schemeClr val="accent2">
-                  <a:shade val="50000"/>
-                </a:schemeClr>
-              </a:lnRef>
-              <a:fillRef idx="1">
-                <a:schemeClr val="accent2"/>
-              </a:fillRef>
-              <a:effectRef idx="0">
-                <a:schemeClr val="accent2"/>
-              </a:effectRef>
-              <a:fontRef idx="minor">
-                <a:schemeClr val="lt1"/>
-              </a:fontRef>
-            </p:style>
-            <p:txBody>
-              <a:bodyPr rtlCol="0" anchor="ctr"/>
-              <a:lstStyle/>
-              <a:p>
-                <a:pPr algn="ctr"/>
-                <a:endParaRPr lang="en-CH"/>
-              </a:p>
-            </p:txBody>
-          </p:sp>
-        </p:grpSp>
-        <p:grpSp>
-          <p:nvGrpSpPr>
-            <p:cNvPr id="141" name="Group 140">
-              <a:extLst>
-                <a:ext uri="{FF2B5EF4-FFF2-40B4-BE49-F238E27FC236}">
-                  <a16:creationId xmlns:a16="http://schemas.microsoft.com/office/drawing/2014/main" id="{A71CB090-545B-2242-ABBB-DEAAA1436AA5}"/>
-                </a:ext>
-              </a:extLst>
-            </p:cNvPr>
-            <p:cNvGrpSpPr/>
-            <p:nvPr/>
-          </p:nvGrpSpPr>
-          <p:grpSpPr>
-            <a:xfrm>
-              <a:off x="5544736" y="1019794"/>
-              <a:ext cx="1111093" cy="1316670"/>
-              <a:chOff x="5045068" y="1150732"/>
-              <a:chExt cx="1111093" cy="1316670"/>
-            </a:xfrm>
-          </p:grpSpPr>
-          <p:sp>
-            <p:nvSpPr>
-              <p:cNvPr id="139" name="Snip Single Corner Rectangle 138">
-                <a:extLst>
-                  <a:ext uri="{FF2B5EF4-FFF2-40B4-BE49-F238E27FC236}">
-                    <a16:creationId xmlns:a16="http://schemas.microsoft.com/office/drawing/2014/main" id="{B580D18A-E072-8148-A16D-A75653813A6F}"/>
-                  </a:ext>
-                </a:extLst>
-              </p:cNvPr>
-              <p:cNvSpPr/>
-              <p:nvPr/>
-            </p:nvSpPr>
-            <p:spPr>
-              <a:xfrm flipH="1">
-                <a:off x="5045068" y="1155627"/>
-                <a:ext cx="1111093" cy="1311775"/>
-              </a:xfrm>
-              <a:prstGeom prst="snip1Rect">
-                <a:avLst/>
-              </a:prstGeom>
-              <a:solidFill>
-                <a:schemeClr val="accent1">
-                  <a:lumMod val="40000"/>
-                  <a:lumOff val="60000"/>
-                </a:schemeClr>
-              </a:solidFill>
-            </p:spPr>
-            <p:style>
-              <a:lnRef idx="2">
-                <a:schemeClr val="accent1">
-                  <a:shade val="50000"/>
-                </a:schemeClr>
-              </a:lnRef>
-              <a:fillRef idx="1">
-                <a:schemeClr val="accent1"/>
-              </a:fillRef>
-              <a:effectRef idx="0">
-                <a:schemeClr val="accent1"/>
-              </a:effectRef>
-              <a:fontRef idx="minor">
-                <a:schemeClr val="lt1"/>
-              </a:fontRef>
-            </p:style>
-            <p:txBody>
-              <a:bodyPr rtlCol="0" anchor="ctr"/>
-              <a:lstStyle/>
-              <a:p>
-                <a:pPr algn="ctr"/>
-                <a:endParaRPr lang="en-CH"/>
-              </a:p>
-            </p:txBody>
-          </p:sp>
-          <p:sp>
-            <p:nvSpPr>
-              <p:cNvPr id="140" name="Right Triangle 139">
-                <a:extLst>
-                  <a:ext uri="{FF2B5EF4-FFF2-40B4-BE49-F238E27FC236}">
-                    <a16:creationId xmlns:a16="http://schemas.microsoft.com/office/drawing/2014/main" id="{C7237F69-2998-9648-8684-4EB60B9DEA11}"/>
-                  </a:ext>
-                </a:extLst>
-              </p:cNvPr>
-              <p:cNvSpPr/>
-              <p:nvPr/>
-            </p:nvSpPr>
-            <p:spPr>
-              <a:xfrm rot="16200000">
-                <a:off x="5045068" y="1150732"/>
-                <a:ext cx="195787" cy="195787"/>
-              </a:xfrm>
-              <a:prstGeom prst="rtTriangle">
-                <a:avLst/>
-              </a:prstGeom>
-              <a:solidFill>
-                <a:schemeClr val="accent1">
-                  <a:lumMod val="75000"/>
-                </a:schemeClr>
-              </a:solidFill>
-              <a:ln>
-                <a:noFill/>
-              </a:ln>
-            </p:spPr>
-            <p:style>
-              <a:lnRef idx="2">
-                <a:schemeClr val="accent1">
-                  <a:shade val="50000"/>
-                </a:schemeClr>
-              </a:lnRef>
-              <a:fillRef idx="1">
-                <a:schemeClr val="accent1"/>
-              </a:fillRef>
-              <a:effectRef idx="0">
-                <a:schemeClr val="accent1"/>
-              </a:effectRef>
-              <a:fontRef idx="minor">
-                <a:schemeClr val="lt1"/>
-              </a:fontRef>
-            </p:style>
-            <p:txBody>
-              <a:bodyPr rtlCol="0" anchor="ctr"/>
-              <a:lstStyle/>
-              <a:p>
-                <a:pPr algn="ctr"/>
-                <a:endParaRPr lang="en-CH"/>
-              </a:p>
-            </p:txBody>
-          </p:sp>
-        </p:grpSp>
-        <p:sp>
-          <p:nvSpPr>
-            <p:cNvPr id="110" name="TextBox 109">
-              <a:extLst>
-                <a:ext uri="{FF2B5EF4-FFF2-40B4-BE49-F238E27FC236}">
-                  <a16:creationId xmlns:a16="http://schemas.microsoft.com/office/drawing/2014/main" id="{671B6489-EBF9-C945-AF06-4334D290DF28}"/>
-                </a:ext>
-              </a:extLst>
-            </p:cNvPr>
-            <p:cNvSpPr txBox="1"/>
-            <p:nvPr/>
-          </p:nvSpPr>
-          <p:spPr>
-            <a:xfrm>
-              <a:off x="5636758" y="1143978"/>
-              <a:ext cx="942822" cy="707886"/>
-            </a:xfrm>
-            <a:prstGeom prst="rect">
-              <a:avLst/>
-            </a:prstGeom>
-            <a:noFill/>
-          </p:spPr>
-          <p:txBody>
-            <a:bodyPr wrap="none" rtlCol="0">
-              <a:spAutoFit/>
-            </a:bodyPr>
-            <a:lstStyle/>
-            <a:p>
-              <a:r>
-                <a:rPr lang="en-CH" sz="4000" b="1" dirty="0">
-                  <a:solidFill>
-                    <a:schemeClr val="tx2"/>
-                  </a:solidFill>
-                </a:rPr>
-                <a:t>JAR</a:t>
-              </a:r>
-              <a:endParaRPr lang="en-CH" sz="7200" b="1" dirty="0">
-                <a:solidFill>
-                  <a:schemeClr val="tx2"/>
-                </a:solidFill>
-              </a:endParaRPr>
-            </a:p>
-          </p:txBody>
-        </p:sp>
-        <p:sp>
-          <p:nvSpPr>
-            <p:cNvPr id="130" name="Snip Single Corner Rectangle 129">
-              <a:extLst>
-                <a:ext uri="{FF2B5EF4-FFF2-40B4-BE49-F238E27FC236}">
-                  <a16:creationId xmlns:a16="http://schemas.microsoft.com/office/drawing/2014/main" id="{C1F6E253-468C-C241-9FA8-9E068161347A}"/>
-                </a:ext>
-              </a:extLst>
-            </p:cNvPr>
-            <p:cNvSpPr/>
-            <p:nvPr/>
-          </p:nvSpPr>
-          <p:spPr>
-            <a:xfrm flipH="1">
-              <a:off x="7729709" y="1014548"/>
-              <a:ext cx="577935" cy="682320"/>
-            </a:xfrm>
-            <a:prstGeom prst="snip1Rect">
-              <a:avLst/>
-            </a:prstGeom>
-            <a:solidFill>
-              <a:schemeClr val="accent1">
-                <a:lumMod val="20000"/>
-                <a:lumOff val="80000"/>
-              </a:schemeClr>
-            </a:solidFill>
-            <a:ln>
-              <a:solidFill>
-                <a:schemeClr val="tx2"/>
-              </a:solidFill>
-            </a:ln>
-          </p:spPr>
-          <p:style>
-            <a:lnRef idx="2">
-              <a:schemeClr val="accent1">
-                <a:shade val="50000"/>
-              </a:schemeClr>
-            </a:lnRef>
-            <a:fillRef idx="1">
-              <a:schemeClr val="accent1"/>
-            </a:fillRef>
-            <a:effectRef idx="0">
-              <a:schemeClr val="accent1"/>
-            </a:effectRef>
-            <a:fontRef idx="minor">
-              <a:schemeClr val="lt1"/>
-            </a:fontRef>
-          </p:style>
-          <p:txBody>
-            <a:bodyPr rtlCol="0" anchor="ctr"/>
-            <a:lstStyle/>
-            <a:p>
-              <a:pPr algn="ctr"/>
-              <a:endParaRPr lang="en-CH"/>
-            </a:p>
-          </p:txBody>
-        </p:sp>
-        <p:sp>
-          <p:nvSpPr>
-            <p:cNvPr id="131" name="Right Triangle 130">
-              <a:extLst>
-                <a:ext uri="{FF2B5EF4-FFF2-40B4-BE49-F238E27FC236}">
-                  <a16:creationId xmlns:a16="http://schemas.microsoft.com/office/drawing/2014/main" id="{BD5B1016-6143-3549-84C9-297524644CA9}"/>
-                </a:ext>
-              </a:extLst>
-            </p:cNvPr>
-            <p:cNvSpPr/>
-            <p:nvPr/>
-          </p:nvSpPr>
-          <p:spPr>
-            <a:xfrm rot="16200000">
-              <a:off x="7729709" y="1012002"/>
-              <a:ext cx="101839" cy="101839"/>
-            </a:xfrm>
-            <a:prstGeom prst="rtTriangle">
-              <a:avLst/>
-            </a:prstGeom>
-            <a:solidFill>
-              <a:schemeClr val="tx2"/>
-            </a:solidFill>
-            <a:ln>
-              <a:noFill/>
-            </a:ln>
-          </p:spPr>
-          <p:style>
-            <a:lnRef idx="2">
-              <a:schemeClr val="accent1">
-                <a:shade val="50000"/>
-              </a:schemeClr>
-            </a:lnRef>
-            <a:fillRef idx="1">
-              <a:schemeClr val="accent1"/>
-            </a:fillRef>
-            <a:effectRef idx="0">
-              <a:schemeClr val="accent1"/>
-            </a:effectRef>
-            <a:fontRef idx="minor">
-              <a:schemeClr val="lt1"/>
-            </a:fontRef>
-          </p:style>
-          <p:txBody>
-            <a:bodyPr rtlCol="0" anchor="ctr"/>
-            <a:lstStyle/>
-            <a:p>
-              <a:pPr algn="ctr"/>
-              <a:endParaRPr lang="en-CH"/>
-            </a:p>
-          </p:txBody>
-        </p:sp>
-        <p:sp>
-          <p:nvSpPr>
-            <p:cNvPr id="142" name="TextBox 141">
-              <a:extLst>
-                <a:ext uri="{FF2B5EF4-FFF2-40B4-BE49-F238E27FC236}">
-                  <a16:creationId xmlns:a16="http://schemas.microsoft.com/office/drawing/2014/main" id="{77DD5ECA-45D0-4E4F-B946-7252A0DF760F}"/>
-                </a:ext>
-              </a:extLst>
-            </p:cNvPr>
-            <p:cNvSpPr txBox="1"/>
-            <p:nvPr/>
-          </p:nvSpPr>
-          <p:spPr>
-            <a:xfrm>
-              <a:off x="7755510" y="1059040"/>
-              <a:ext cx="563744" cy="400110"/>
-            </a:xfrm>
-            <a:prstGeom prst="rect">
-              <a:avLst/>
-            </a:prstGeom>
-            <a:noFill/>
-          </p:spPr>
-          <p:txBody>
-            <a:bodyPr wrap="none" rtlCol="0">
-              <a:spAutoFit/>
-            </a:bodyPr>
-            <a:lstStyle/>
-            <a:p>
-              <a:r>
-                <a:rPr lang="en-CH" sz="2000" b="1" dirty="0">
-                  <a:solidFill>
-                    <a:schemeClr val="tx2"/>
-                  </a:solidFill>
-                </a:rPr>
-                <a:t>JAR</a:t>
-              </a:r>
-              <a:endParaRPr lang="en-CH" sz="2600" b="1" dirty="0">
-                <a:solidFill>
-                  <a:schemeClr val="tx2"/>
-                </a:solidFill>
-              </a:endParaRPr>
-            </a:p>
-          </p:txBody>
-        </p:sp>
-        <p:sp>
-          <p:nvSpPr>
-            <p:cNvPr id="147" name="Snip Single Corner Rectangle 146">
-              <a:extLst>
-                <a:ext uri="{FF2B5EF4-FFF2-40B4-BE49-F238E27FC236}">
-                  <a16:creationId xmlns:a16="http://schemas.microsoft.com/office/drawing/2014/main" id="{E1E1494C-95AC-C243-984F-EAC5425E1D2A}"/>
-                </a:ext>
-              </a:extLst>
-            </p:cNvPr>
-            <p:cNvSpPr/>
-            <p:nvPr/>
-          </p:nvSpPr>
-          <p:spPr>
-            <a:xfrm flipH="1">
-              <a:off x="7962677" y="1447626"/>
-              <a:ext cx="687356" cy="811504"/>
-            </a:xfrm>
-            <a:prstGeom prst="snip1Rect">
-              <a:avLst/>
-            </a:prstGeom>
-            <a:solidFill>
-              <a:schemeClr val="accent1">
-                <a:lumMod val="20000"/>
-                <a:lumOff val="80000"/>
-              </a:schemeClr>
-            </a:solidFill>
-            <a:ln>
-              <a:solidFill>
-                <a:schemeClr val="tx2"/>
-              </a:solidFill>
-            </a:ln>
-          </p:spPr>
-          <p:style>
-            <a:lnRef idx="2">
-              <a:schemeClr val="accent1">
-                <a:shade val="50000"/>
-              </a:schemeClr>
-            </a:lnRef>
-            <a:fillRef idx="1">
-              <a:schemeClr val="accent1"/>
-            </a:fillRef>
-            <a:effectRef idx="0">
-              <a:schemeClr val="accent1"/>
-            </a:effectRef>
-            <a:fontRef idx="minor">
-              <a:schemeClr val="lt1"/>
-            </a:fontRef>
-          </p:style>
-          <p:txBody>
-            <a:bodyPr rtlCol="0" anchor="ctr"/>
-            <a:lstStyle/>
-            <a:p>
-              <a:pPr algn="ctr"/>
-              <a:endParaRPr lang="en-CH"/>
-            </a:p>
-          </p:txBody>
-        </p:sp>
-        <p:sp>
-          <p:nvSpPr>
-            <p:cNvPr id="148" name="Right Triangle 147">
-              <a:extLst>
-                <a:ext uri="{FF2B5EF4-FFF2-40B4-BE49-F238E27FC236}">
-                  <a16:creationId xmlns:a16="http://schemas.microsoft.com/office/drawing/2014/main" id="{C081EBC2-3F13-4A4B-A514-8DB0AA60CF54}"/>
-                </a:ext>
-              </a:extLst>
-            </p:cNvPr>
-            <p:cNvSpPr/>
-            <p:nvPr/>
-          </p:nvSpPr>
-          <p:spPr>
-            <a:xfrm rot="16200000">
-              <a:off x="7962677" y="1444598"/>
-              <a:ext cx="121120" cy="121120"/>
-            </a:xfrm>
-            <a:prstGeom prst="rtTriangle">
-              <a:avLst/>
-            </a:prstGeom>
-            <a:solidFill>
-              <a:schemeClr val="tx2"/>
-            </a:solidFill>
-            <a:ln>
-              <a:noFill/>
-            </a:ln>
-          </p:spPr>
-          <p:style>
-            <a:lnRef idx="2">
-              <a:schemeClr val="accent1">
-                <a:shade val="50000"/>
-              </a:schemeClr>
-            </a:lnRef>
-            <a:fillRef idx="1">
-              <a:schemeClr val="accent1"/>
-            </a:fillRef>
-            <a:effectRef idx="0">
-              <a:schemeClr val="accent1"/>
-            </a:effectRef>
-            <a:fontRef idx="minor">
-              <a:schemeClr val="lt1"/>
-            </a:fontRef>
-          </p:style>
-          <p:txBody>
-            <a:bodyPr rtlCol="0" anchor="ctr"/>
-            <a:lstStyle/>
-            <a:p>
-              <a:pPr algn="ctr"/>
-              <a:endParaRPr lang="en-CH"/>
-            </a:p>
-          </p:txBody>
-        </p:sp>
-        <p:sp>
-          <p:nvSpPr>
-            <p:cNvPr id="146" name="TextBox 145">
-              <a:extLst>
-                <a:ext uri="{FF2B5EF4-FFF2-40B4-BE49-F238E27FC236}">
-                  <a16:creationId xmlns:a16="http://schemas.microsoft.com/office/drawing/2014/main" id="{341CA62C-3290-6A4F-BBB9-CB95A60E4B86}"/>
-                </a:ext>
-              </a:extLst>
-            </p:cNvPr>
-            <p:cNvSpPr txBox="1"/>
-            <p:nvPr/>
-          </p:nvSpPr>
-          <p:spPr>
-            <a:xfrm>
-              <a:off x="7993363" y="1500542"/>
-              <a:ext cx="677493" cy="492443"/>
-            </a:xfrm>
-            <a:prstGeom prst="rect">
-              <a:avLst/>
-            </a:prstGeom>
-            <a:noFill/>
-          </p:spPr>
-          <p:txBody>
-            <a:bodyPr wrap="none" rtlCol="0">
-              <a:spAutoFit/>
-            </a:bodyPr>
-            <a:lstStyle/>
-            <a:p>
-              <a:r>
-                <a:rPr lang="en-CH" sz="2600" b="1" dirty="0">
-                  <a:solidFill>
-                    <a:schemeClr val="tx2"/>
-                  </a:solidFill>
-                </a:rPr>
-                <a:t>JAR</a:t>
-              </a:r>
-            </a:p>
-          </p:txBody>
-        </p:sp>
-        <p:sp>
-          <p:nvSpPr>
-            <p:cNvPr id="152" name="Snip Single Corner Rectangle 151">
-              <a:extLst>
-                <a:ext uri="{FF2B5EF4-FFF2-40B4-BE49-F238E27FC236}">
-                  <a16:creationId xmlns:a16="http://schemas.microsoft.com/office/drawing/2014/main" id="{9E69D7A9-4F4F-674C-B2F7-77E8C9D7F6FB}"/>
-                </a:ext>
-              </a:extLst>
-            </p:cNvPr>
-            <p:cNvSpPr/>
-            <p:nvPr/>
-          </p:nvSpPr>
-          <p:spPr>
-            <a:xfrm flipH="1">
-              <a:off x="7657026" y="1906498"/>
-              <a:ext cx="470067" cy="554967"/>
-            </a:xfrm>
-            <a:prstGeom prst="snip1Rect">
-              <a:avLst/>
-            </a:prstGeom>
-            <a:solidFill>
-              <a:schemeClr val="accent1">
-                <a:lumMod val="20000"/>
-                <a:lumOff val="80000"/>
-              </a:schemeClr>
-            </a:solidFill>
-            <a:ln>
-              <a:solidFill>
-                <a:schemeClr val="tx2"/>
-              </a:solidFill>
-            </a:ln>
-          </p:spPr>
-          <p:style>
-            <a:lnRef idx="2">
-              <a:schemeClr val="accent1">
-                <a:shade val="50000"/>
-              </a:schemeClr>
-            </a:lnRef>
-            <a:fillRef idx="1">
-              <a:schemeClr val="accent1"/>
-            </a:fillRef>
-            <a:effectRef idx="0">
-              <a:schemeClr val="accent1"/>
-            </a:effectRef>
-            <a:fontRef idx="minor">
-              <a:schemeClr val="lt1"/>
-            </a:fontRef>
-          </p:style>
-          <p:txBody>
-            <a:bodyPr rtlCol="0" anchor="ctr"/>
-            <a:lstStyle/>
-            <a:p>
-              <a:pPr algn="ctr"/>
-              <a:endParaRPr lang="en-CH"/>
-            </a:p>
-          </p:txBody>
-        </p:sp>
-        <p:sp>
-          <p:nvSpPr>
-            <p:cNvPr id="153" name="Right Triangle 152">
-              <a:extLst>
-                <a:ext uri="{FF2B5EF4-FFF2-40B4-BE49-F238E27FC236}">
-                  <a16:creationId xmlns:a16="http://schemas.microsoft.com/office/drawing/2014/main" id="{28457923-919B-AA47-860C-D25D87D698D5}"/>
-                </a:ext>
-              </a:extLst>
-            </p:cNvPr>
-            <p:cNvSpPr/>
-            <p:nvPr/>
-          </p:nvSpPr>
-          <p:spPr>
-            <a:xfrm rot="16200000">
-              <a:off x="7657026" y="1904427"/>
-              <a:ext cx="82831" cy="82831"/>
-            </a:xfrm>
-            <a:prstGeom prst="rtTriangle">
-              <a:avLst/>
-            </a:prstGeom>
-            <a:solidFill>
-              <a:schemeClr val="tx2"/>
-            </a:solidFill>
-            <a:ln>
-              <a:noFill/>
-            </a:ln>
-          </p:spPr>
-          <p:style>
-            <a:lnRef idx="2">
-              <a:schemeClr val="accent1">
-                <a:shade val="50000"/>
-              </a:schemeClr>
-            </a:lnRef>
-            <a:fillRef idx="1">
-              <a:schemeClr val="accent1"/>
-            </a:fillRef>
-            <a:effectRef idx="0">
-              <a:schemeClr val="accent1"/>
-            </a:effectRef>
-            <a:fontRef idx="minor">
-              <a:schemeClr val="lt1"/>
-            </a:fontRef>
-          </p:style>
-          <p:txBody>
-            <a:bodyPr rtlCol="0" anchor="ctr"/>
-            <a:lstStyle/>
-            <a:p>
-              <a:pPr algn="ctr"/>
-              <a:endParaRPr lang="en-CH"/>
-            </a:p>
-          </p:txBody>
-        </p:sp>
-        <p:sp>
-          <p:nvSpPr>
-            <p:cNvPr id="151" name="TextBox 150">
-              <a:extLst>
-                <a:ext uri="{FF2B5EF4-FFF2-40B4-BE49-F238E27FC236}">
-                  <a16:creationId xmlns:a16="http://schemas.microsoft.com/office/drawing/2014/main" id="{8CA60311-DBED-6047-932B-78E50C450E53}"/>
-                </a:ext>
-              </a:extLst>
-            </p:cNvPr>
-            <p:cNvSpPr txBox="1"/>
-            <p:nvPr/>
-          </p:nvSpPr>
-          <p:spPr>
-            <a:xfrm>
-              <a:off x="7662777" y="1954104"/>
-              <a:ext cx="487954" cy="338554"/>
-            </a:xfrm>
-            <a:prstGeom prst="rect">
-              <a:avLst/>
-            </a:prstGeom>
-            <a:noFill/>
-          </p:spPr>
-          <p:txBody>
-            <a:bodyPr wrap="none" rtlCol="0">
-              <a:spAutoFit/>
-            </a:bodyPr>
-            <a:lstStyle/>
-            <a:p>
-              <a:r>
-                <a:rPr lang="en-CH" sz="1600" b="1" dirty="0">
-                  <a:solidFill>
-                    <a:schemeClr val="tx2"/>
-                  </a:solidFill>
-                </a:rPr>
-                <a:t>JAR</a:t>
-              </a:r>
-              <a:endParaRPr lang="en-CH" sz="2600" b="1" dirty="0">
-                <a:solidFill>
-                  <a:schemeClr val="tx2"/>
-                </a:solidFill>
-              </a:endParaRPr>
-            </a:p>
-          </p:txBody>
-        </p:sp>
-        <p:sp>
-          <p:nvSpPr>
-            <p:cNvPr id="156" name="Circular Arrow 155">
-              <a:extLst>
-                <a:ext uri="{FF2B5EF4-FFF2-40B4-BE49-F238E27FC236}">
-                  <a16:creationId xmlns:a16="http://schemas.microsoft.com/office/drawing/2014/main" id="{EE460D29-21B2-1C46-BF3B-4860D601D8E7}"/>
-                </a:ext>
-              </a:extLst>
-            </p:cNvPr>
-            <p:cNvSpPr/>
-            <p:nvPr/>
-          </p:nvSpPr>
-          <p:spPr>
-            <a:xfrm rot="9732450">
-              <a:off x="6648056" y="1036999"/>
-              <a:ext cx="1079501" cy="1079501"/>
-            </a:xfrm>
-            <a:prstGeom prst="circularArrow">
-              <a:avLst>
-                <a:gd name="adj1" fmla="val 5244"/>
-                <a:gd name="adj2" fmla="val 992223"/>
-                <a:gd name="adj3" fmla="val 20489948"/>
-                <a:gd name="adj4" fmla="val 13846572"/>
-                <a:gd name="adj5" fmla="val 8717"/>
-              </a:avLst>
-            </a:prstGeom>
-            <a:solidFill>
-              <a:schemeClr val="tx1">
-                <a:lumMod val="50000"/>
-                <a:lumOff val="50000"/>
-              </a:schemeClr>
-            </a:solidFill>
-            <a:ln>
-              <a:noFill/>
-            </a:ln>
-          </p:spPr>
-          <p:style>
-            <a:lnRef idx="2">
-              <a:schemeClr val="accent1">
-                <a:shade val="50000"/>
-              </a:schemeClr>
-            </a:lnRef>
-            <a:fillRef idx="1">
-              <a:schemeClr val="accent1"/>
-            </a:fillRef>
-            <a:effectRef idx="0">
-              <a:schemeClr val="accent1"/>
-            </a:effectRef>
-            <a:fontRef idx="minor">
-              <a:schemeClr val="lt1"/>
-            </a:fontRef>
-          </p:style>
-          <p:txBody>
-            <a:bodyPr rtlCol="0" anchor="ctr"/>
-            <a:lstStyle/>
-            <a:p>
-              <a:pPr algn="ctr"/>
-              <a:endParaRPr lang="en-CH">
-                <a:solidFill>
-                  <a:schemeClr val="tx1"/>
-                </a:solidFill>
-              </a:endParaRPr>
-            </a:p>
-          </p:txBody>
-        </p:sp>
-        <p:sp>
-          <p:nvSpPr>
-            <p:cNvPr id="157" name="Circular Arrow 156">
-              <a:extLst>
-                <a:ext uri="{FF2B5EF4-FFF2-40B4-BE49-F238E27FC236}">
-                  <a16:creationId xmlns:a16="http://schemas.microsoft.com/office/drawing/2014/main" id="{3F006D5A-FC08-364D-BD7F-08DF316877A7}"/>
-                </a:ext>
-              </a:extLst>
-            </p:cNvPr>
-            <p:cNvSpPr/>
-            <p:nvPr/>
-          </p:nvSpPr>
-          <p:spPr>
-            <a:xfrm rot="20532450">
-              <a:off x="6648056" y="1256717"/>
-              <a:ext cx="1079501" cy="1079501"/>
-            </a:xfrm>
-            <a:prstGeom prst="circularArrow">
-              <a:avLst>
-                <a:gd name="adj1" fmla="val 5244"/>
-                <a:gd name="adj2" fmla="val 992223"/>
-                <a:gd name="adj3" fmla="val 20489948"/>
-                <a:gd name="adj4" fmla="val 13846572"/>
-                <a:gd name="adj5" fmla="val 8717"/>
-              </a:avLst>
-            </a:prstGeom>
-            <a:solidFill>
-              <a:schemeClr val="tx1">
-                <a:lumMod val="50000"/>
-                <a:lumOff val="50000"/>
-              </a:schemeClr>
-            </a:solidFill>
-            <a:ln>
-              <a:noFill/>
-            </a:ln>
-          </p:spPr>
-          <p:style>
-            <a:lnRef idx="2">
-              <a:schemeClr val="accent1">
-                <a:shade val="50000"/>
-              </a:schemeClr>
-            </a:lnRef>
-            <a:fillRef idx="1">
-              <a:schemeClr val="accent1"/>
-            </a:fillRef>
-            <a:effectRef idx="0">
-              <a:schemeClr val="accent1"/>
-            </a:effectRef>
-            <a:fontRef idx="minor">
-              <a:schemeClr val="lt1"/>
-            </a:fontRef>
-          </p:style>
-          <p:txBody>
-            <a:bodyPr rtlCol="0" anchor="ctr"/>
-            <a:lstStyle/>
-            <a:p>
-              <a:pPr algn="ctr"/>
-              <a:endParaRPr lang="en-CH">
-                <a:solidFill>
-                  <a:schemeClr val="tx1"/>
-                </a:solidFill>
-              </a:endParaRPr>
-            </a:p>
-          </p:txBody>
-        </p:sp>
-      </p:grpSp>
-      <p:sp>
-        <p:nvSpPr>
-          <p:cNvPr id="159" name="Rectangle 158">
-            <a:extLst>
-              <a:ext uri="{FF2B5EF4-FFF2-40B4-BE49-F238E27FC236}">
-                <a16:creationId xmlns:a16="http://schemas.microsoft.com/office/drawing/2014/main" id="{72B23541-90A7-654B-9080-EC614543FDF9}"/>
-              </a:ext>
-            </a:extLst>
-          </p:cNvPr>
-          <p:cNvSpPr/>
-          <p:nvPr/>
-        </p:nvSpPr>
-        <p:spPr>
-          <a:xfrm>
-            <a:off x="5199312" y="2859331"/>
-            <a:ext cx="3600000" cy="1800000"/>
-          </a:xfrm>
-          <a:prstGeom prst="rect">
-            <a:avLst/>
-          </a:prstGeom>
-          <a:solidFill>
-            <a:schemeClr val="bg1">
-              <a:lumMod val="85000"/>
-            </a:schemeClr>
-          </a:solidFill>
-          <a:ln w="3175"/>
-        </p:spPr>
-        <p:style>
-          <a:lnRef idx="2">
-            <a:schemeClr val="accent1">
-              <a:shade val="50000"/>
-            </a:schemeClr>
-          </a:lnRef>
-          <a:fillRef idx="1">
-            <a:schemeClr val="accent1"/>
-          </a:fillRef>
-          <a:effectRef idx="0">
-            <a:schemeClr val="accent1"/>
-          </a:effectRef>
-          <a:fontRef idx="minor">
-            <a:schemeClr val="lt1"/>
-          </a:fontRef>
-        </p:style>
-        <p:txBody>
-          <a:bodyPr rtlCol="0" anchor="ctr"/>
-          <a:lstStyle/>
-          <a:p>
-            <a:pPr algn="ctr"/>
-            <a:endParaRPr lang="en-CH" dirty="0"/>
-          </a:p>
-        </p:txBody>
-      </p:sp>
-      <p:grpSp>
-        <p:nvGrpSpPr>
-          <p:cNvPr id="162" name="Group 161">
-            <a:extLst>
-              <a:ext uri="{FF2B5EF4-FFF2-40B4-BE49-F238E27FC236}">
-                <a16:creationId xmlns:a16="http://schemas.microsoft.com/office/drawing/2014/main" id="{89F7BDD7-89E3-E242-808D-DA6492F7D265}"/>
-              </a:ext>
-            </a:extLst>
-          </p:cNvPr>
-          <p:cNvGrpSpPr/>
-          <p:nvPr/>
-        </p:nvGrpSpPr>
-        <p:grpSpPr>
-          <a:xfrm>
-            <a:off x="5436252" y="3061442"/>
-            <a:ext cx="1111093" cy="1316670"/>
-            <a:chOff x="5045068" y="1150732"/>
-            <a:chExt cx="1111093" cy="1316670"/>
-          </a:xfrm>
-        </p:grpSpPr>
-        <p:sp>
-          <p:nvSpPr>
-            <p:cNvPr id="175" name="Snip Single Corner Rectangle 174">
-              <a:extLst>
-                <a:ext uri="{FF2B5EF4-FFF2-40B4-BE49-F238E27FC236}">
-                  <a16:creationId xmlns:a16="http://schemas.microsoft.com/office/drawing/2014/main" id="{E7C736B7-2267-A24A-AA37-89836A97652B}"/>
-                </a:ext>
-              </a:extLst>
-            </p:cNvPr>
-            <p:cNvSpPr/>
-            <p:nvPr/>
-          </p:nvSpPr>
-          <p:spPr>
-            <a:xfrm flipH="1">
-              <a:off x="5045068" y="1155627"/>
-              <a:ext cx="1111093" cy="1311775"/>
-            </a:xfrm>
-            <a:prstGeom prst="snip1Rect">
-              <a:avLst/>
-            </a:prstGeom>
-            <a:solidFill>
-              <a:schemeClr val="accent1">
-                <a:lumMod val="40000"/>
-                <a:lumOff val="60000"/>
-              </a:schemeClr>
-            </a:solidFill>
-          </p:spPr>
-          <p:style>
-            <a:lnRef idx="2">
-              <a:schemeClr val="accent1">
-                <a:shade val="50000"/>
-              </a:schemeClr>
-            </a:lnRef>
-            <a:fillRef idx="1">
-              <a:schemeClr val="accent1"/>
-            </a:fillRef>
-            <a:effectRef idx="0">
-              <a:schemeClr val="accent1"/>
-            </a:effectRef>
-            <a:fontRef idx="minor">
-              <a:schemeClr val="lt1"/>
-            </a:fontRef>
-          </p:style>
-          <p:txBody>
-            <a:bodyPr rtlCol="0" anchor="ctr"/>
-            <a:lstStyle/>
-            <a:p>
-              <a:pPr algn="ctr"/>
-              <a:endParaRPr lang="en-CH"/>
-            </a:p>
-          </p:txBody>
-        </p:sp>
-        <p:sp>
-          <p:nvSpPr>
-            <p:cNvPr id="176" name="Right Triangle 175">
-              <a:extLst>
-                <a:ext uri="{FF2B5EF4-FFF2-40B4-BE49-F238E27FC236}">
-                  <a16:creationId xmlns:a16="http://schemas.microsoft.com/office/drawing/2014/main" id="{8FED0271-E202-ED49-A80F-15F4DF2F3B61}"/>
-                </a:ext>
-              </a:extLst>
-            </p:cNvPr>
-            <p:cNvSpPr/>
-            <p:nvPr/>
-          </p:nvSpPr>
-          <p:spPr>
-            <a:xfrm rot="16200000">
-              <a:off x="5045068" y="1150732"/>
-              <a:ext cx="195787" cy="195787"/>
-            </a:xfrm>
-            <a:prstGeom prst="rtTriangle">
-              <a:avLst/>
-            </a:prstGeom>
-            <a:solidFill>
-              <a:schemeClr val="accent1">
-                <a:lumMod val="75000"/>
-              </a:schemeClr>
-            </a:solidFill>
-            <a:ln>
-              <a:noFill/>
-            </a:ln>
-          </p:spPr>
-          <p:style>
-            <a:lnRef idx="2">
-              <a:schemeClr val="accent1">
-                <a:shade val="50000"/>
-              </a:schemeClr>
-            </a:lnRef>
-            <a:fillRef idx="1">
-              <a:schemeClr val="accent1"/>
-            </a:fillRef>
-            <a:effectRef idx="0">
-              <a:schemeClr val="accent1"/>
-            </a:effectRef>
-            <a:fontRef idx="minor">
-              <a:schemeClr val="lt1"/>
-            </a:fontRef>
-          </p:style>
-          <p:txBody>
-            <a:bodyPr rtlCol="0" anchor="ctr"/>
-            <a:lstStyle/>
-            <a:p>
-              <a:pPr algn="ctr"/>
-              <a:endParaRPr lang="en-CH"/>
-            </a:p>
-          </p:txBody>
-        </p:sp>
-      </p:grpSp>
-      <p:sp>
-        <p:nvSpPr>
-          <p:cNvPr id="163" name="TextBox 162">
-            <a:extLst>
-              <a:ext uri="{FF2B5EF4-FFF2-40B4-BE49-F238E27FC236}">
-                <a16:creationId xmlns:a16="http://schemas.microsoft.com/office/drawing/2014/main" id="{F11BA415-372A-4B49-A8B2-544327D4952F}"/>
-              </a:ext>
-            </a:extLst>
-          </p:cNvPr>
-          <p:cNvSpPr txBox="1"/>
-          <p:nvPr/>
-        </p:nvSpPr>
-        <p:spPr>
-          <a:xfrm>
-            <a:off x="5528274" y="3185626"/>
-            <a:ext cx="942822" cy="707886"/>
-          </a:xfrm>
-          <a:prstGeom prst="rect">
-            <a:avLst/>
-          </a:prstGeom>
-          <a:noFill/>
-        </p:spPr>
-        <p:txBody>
-          <a:bodyPr wrap="none" rtlCol="0">
-            <a:spAutoFit/>
-          </a:bodyPr>
-          <a:lstStyle/>
-          <a:p>
-            <a:r>
-              <a:rPr lang="en-CH" sz="4000" b="1" dirty="0">
-                <a:solidFill>
-                  <a:schemeClr val="tx2"/>
-                </a:solidFill>
-              </a:rPr>
-              <a:t>JAR</a:t>
-            </a:r>
-            <a:endParaRPr lang="en-CH" sz="7200" b="1" dirty="0">
-              <a:solidFill>
-                <a:schemeClr val="tx2"/>
-              </a:solidFill>
-            </a:endParaRPr>
-          </a:p>
-        </p:txBody>
-      </p:sp>
-      <p:sp>
-        <p:nvSpPr>
-          <p:cNvPr id="164" name="Snip Single Corner Rectangle 163">
-            <a:extLst>
-              <a:ext uri="{FF2B5EF4-FFF2-40B4-BE49-F238E27FC236}">
-                <a16:creationId xmlns:a16="http://schemas.microsoft.com/office/drawing/2014/main" id="{F6DF76F2-F209-E141-98CC-3B4F71E80048}"/>
-              </a:ext>
-            </a:extLst>
-          </p:cNvPr>
-          <p:cNvSpPr/>
-          <p:nvPr/>
-        </p:nvSpPr>
-        <p:spPr>
-          <a:xfrm flipH="1">
-            <a:off x="7621225" y="3056196"/>
-            <a:ext cx="577935" cy="682320"/>
-          </a:xfrm>
-          <a:prstGeom prst="snip1Rect">
-            <a:avLst/>
-          </a:prstGeom>
-          <a:solidFill>
-            <a:schemeClr val="accent1">
-              <a:lumMod val="20000"/>
-              <a:lumOff val="80000"/>
-            </a:schemeClr>
-          </a:solidFill>
-          <a:ln>
-            <a:solidFill>
-              <a:schemeClr val="tx2"/>
-            </a:solidFill>
-          </a:ln>
-        </p:spPr>
-        <p:style>
-          <a:lnRef idx="2">
-            <a:schemeClr val="accent1">
-              <a:shade val="50000"/>
-            </a:schemeClr>
-          </a:lnRef>
-          <a:fillRef idx="1">
-            <a:schemeClr val="accent1"/>
-          </a:fillRef>
-          <a:effectRef idx="0">
-            <a:schemeClr val="accent1"/>
-          </a:effectRef>
-          <a:fontRef idx="minor">
-            <a:schemeClr val="lt1"/>
-          </a:fontRef>
-        </p:style>
-        <p:txBody>
-          <a:bodyPr rtlCol="0" anchor="ctr"/>
-          <a:lstStyle/>
-          <a:p>
-            <a:pPr algn="ctr"/>
-            <a:endParaRPr lang="en-CH"/>
-          </a:p>
-        </p:txBody>
-      </p:sp>
-      <p:sp>
-        <p:nvSpPr>
-          <p:cNvPr id="165" name="Right Triangle 164">
-            <a:extLst>
-              <a:ext uri="{FF2B5EF4-FFF2-40B4-BE49-F238E27FC236}">
-                <a16:creationId xmlns:a16="http://schemas.microsoft.com/office/drawing/2014/main" id="{1DC255A6-0479-0646-825C-15FA95D94339}"/>
-              </a:ext>
-            </a:extLst>
-          </p:cNvPr>
-          <p:cNvSpPr/>
-          <p:nvPr/>
-        </p:nvSpPr>
-        <p:spPr>
-          <a:xfrm rot="16200000">
-            <a:off x="7621225" y="3053650"/>
-            <a:ext cx="101839" cy="101839"/>
-          </a:xfrm>
-          <a:prstGeom prst="rtTriangle">
-            <a:avLst/>
-          </a:prstGeom>
-          <a:solidFill>
-            <a:schemeClr val="tx2"/>
-          </a:solidFill>
-          <a:ln>
-            <a:noFill/>
-          </a:ln>
-        </p:spPr>
-        <p:style>
-          <a:lnRef idx="2">
-            <a:schemeClr val="accent1">
-              <a:shade val="50000"/>
-            </a:schemeClr>
-          </a:lnRef>
-          <a:fillRef idx="1">
-            <a:schemeClr val="accent1"/>
-          </a:fillRef>
-          <a:effectRef idx="0">
-            <a:schemeClr val="accent1"/>
-          </a:effectRef>
-          <a:fontRef idx="minor">
-            <a:schemeClr val="lt1"/>
-          </a:fontRef>
-        </p:style>
-        <p:txBody>
-          <a:bodyPr rtlCol="0" anchor="ctr"/>
-          <a:lstStyle/>
-          <a:p>
-            <a:pPr algn="ctr"/>
-            <a:endParaRPr lang="en-CH"/>
-          </a:p>
-        </p:txBody>
-      </p:sp>
-      <p:sp>
-        <p:nvSpPr>
-          <p:cNvPr id="166" name="TextBox 165">
-            <a:extLst>
-              <a:ext uri="{FF2B5EF4-FFF2-40B4-BE49-F238E27FC236}">
-                <a16:creationId xmlns:a16="http://schemas.microsoft.com/office/drawing/2014/main" id="{7F0CC8B1-2D58-EC42-BB04-B5763E521009}"/>
-              </a:ext>
-            </a:extLst>
-          </p:cNvPr>
-          <p:cNvSpPr txBox="1"/>
-          <p:nvPr/>
-        </p:nvSpPr>
-        <p:spPr>
-          <a:xfrm>
-            <a:off x="7647026" y="3100688"/>
-            <a:ext cx="563744" cy="400110"/>
-          </a:xfrm>
-          <a:prstGeom prst="rect">
-            <a:avLst/>
-          </a:prstGeom>
-          <a:noFill/>
-        </p:spPr>
-        <p:txBody>
-          <a:bodyPr wrap="none" rtlCol="0">
-            <a:spAutoFit/>
-          </a:bodyPr>
-          <a:lstStyle/>
-          <a:p>
-            <a:r>
-              <a:rPr lang="en-CH" sz="2000" b="1" dirty="0">
-                <a:solidFill>
-                  <a:schemeClr val="tx2"/>
-                </a:solidFill>
-              </a:rPr>
-              <a:t>JAR</a:t>
-            </a:r>
-            <a:endParaRPr lang="en-CH" sz="2600" b="1" dirty="0">
-              <a:solidFill>
-                <a:schemeClr val="tx2"/>
-              </a:solidFill>
-            </a:endParaRPr>
-          </a:p>
-        </p:txBody>
-      </p:sp>
-      <p:sp>
-        <p:nvSpPr>
-          <p:cNvPr id="167" name="Snip Single Corner Rectangle 166">
-            <a:extLst>
-              <a:ext uri="{FF2B5EF4-FFF2-40B4-BE49-F238E27FC236}">
-                <a16:creationId xmlns:a16="http://schemas.microsoft.com/office/drawing/2014/main" id="{F35F538A-89B2-3A4B-9A28-94E1535040CD}"/>
-              </a:ext>
-            </a:extLst>
-          </p:cNvPr>
-          <p:cNvSpPr/>
-          <p:nvPr/>
-        </p:nvSpPr>
-        <p:spPr>
-          <a:xfrm flipH="1">
-            <a:off x="7854193" y="3489274"/>
-            <a:ext cx="687356" cy="811504"/>
-          </a:xfrm>
-          <a:prstGeom prst="snip1Rect">
-            <a:avLst/>
-          </a:prstGeom>
-          <a:solidFill>
-            <a:schemeClr val="accent1">
-              <a:lumMod val="20000"/>
-              <a:lumOff val="80000"/>
-            </a:schemeClr>
-          </a:solidFill>
-          <a:ln>
-            <a:solidFill>
-              <a:schemeClr val="tx2"/>
-            </a:solidFill>
-          </a:ln>
-        </p:spPr>
-        <p:style>
-          <a:lnRef idx="2">
-            <a:schemeClr val="accent1">
-              <a:shade val="50000"/>
-            </a:schemeClr>
-          </a:lnRef>
-          <a:fillRef idx="1">
-            <a:schemeClr val="accent1"/>
-          </a:fillRef>
-          <a:effectRef idx="0">
-            <a:schemeClr val="accent1"/>
-          </a:effectRef>
-          <a:fontRef idx="minor">
-            <a:schemeClr val="lt1"/>
-          </a:fontRef>
-        </p:style>
-        <p:txBody>
-          <a:bodyPr rtlCol="0" anchor="ctr"/>
-          <a:lstStyle/>
-          <a:p>
-            <a:pPr algn="ctr"/>
-            <a:endParaRPr lang="en-CH"/>
-          </a:p>
-        </p:txBody>
-      </p:sp>
-      <p:sp>
-        <p:nvSpPr>
-          <p:cNvPr id="168" name="Right Triangle 167">
-            <a:extLst>
-              <a:ext uri="{FF2B5EF4-FFF2-40B4-BE49-F238E27FC236}">
-                <a16:creationId xmlns:a16="http://schemas.microsoft.com/office/drawing/2014/main" id="{72553A4D-2290-FD48-9554-D5C803A39EF6}"/>
-              </a:ext>
-            </a:extLst>
-          </p:cNvPr>
-          <p:cNvSpPr/>
-          <p:nvPr/>
-        </p:nvSpPr>
-        <p:spPr>
-          <a:xfrm rot="16200000">
-            <a:off x="7854193" y="3486246"/>
-            <a:ext cx="121120" cy="121120"/>
-          </a:xfrm>
-          <a:prstGeom prst="rtTriangle">
-            <a:avLst/>
-          </a:prstGeom>
-          <a:solidFill>
-            <a:schemeClr val="tx2"/>
-          </a:solidFill>
-          <a:ln>
-            <a:noFill/>
-          </a:ln>
-        </p:spPr>
-        <p:style>
-          <a:lnRef idx="2">
-            <a:schemeClr val="accent1">
-              <a:shade val="50000"/>
-            </a:schemeClr>
-          </a:lnRef>
-          <a:fillRef idx="1">
-            <a:schemeClr val="accent1"/>
-          </a:fillRef>
-          <a:effectRef idx="0">
-            <a:schemeClr val="accent1"/>
-          </a:effectRef>
-          <a:fontRef idx="minor">
-            <a:schemeClr val="lt1"/>
-          </a:fontRef>
-        </p:style>
-        <p:txBody>
-          <a:bodyPr rtlCol="0" anchor="ctr"/>
-          <a:lstStyle/>
-          <a:p>
-            <a:pPr algn="ctr"/>
-            <a:endParaRPr lang="en-CH"/>
-          </a:p>
-        </p:txBody>
-      </p:sp>
-      <p:sp>
-        <p:nvSpPr>
-          <p:cNvPr id="169" name="TextBox 168">
-            <a:extLst>
-              <a:ext uri="{FF2B5EF4-FFF2-40B4-BE49-F238E27FC236}">
-                <a16:creationId xmlns:a16="http://schemas.microsoft.com/office/drawing/2014/main" id="{3883D13A-3563-4045-9F75-B16313037DFF}"/>
-              </a:ext>
-            </a:extLst>
-          </p:cNvPr>
-          <p:cNvSpPr txBox="1"/>
-          <p:nvPr/>
-        </p:nvSpPr>
-        <p:spPr>
-          <a:xfrm>
-            <a:off x="7884879" y="3542190"/>
-            <a:ext cx="677493" cy="492443"/>
-          </a:xfrm>
-          <a:prstGeom prst="rect">
-            <a:avLst/>
-          </a:prstGeom>
-          <a:noFill/>
-        </p:spPr>
-        <p:txBody>
-          <a:bodyPr wrap="none" rtlCol="0">
-            <a:spAutoFit/>
-          </a:bodyPr>
-          <a:lstStyle/>
-          <a:p>
-            <a:r>
-              <a:rPr lang="en-CH" sz="2600" b="1" dirty="0">
-                <a:solidFill>
-                  <a:schemeClr val="tx2"/>
-                </a:solidFill>
-              </a:rPr>
-              <a:t>JAR</a:t>
-            </a:r>
-          </a:p>
-        </p:txBody>
-      </p:sp>
-      <p:sp>
-        <p:nvSpPr>
-          <p:cNvPr id="170" name="Snip Single Corner Rectangle 169">
-            <a:extLst>
-              <a:ext uri="{FF2B5EF4-FFF2-40B4-BE49-F238E27FC236}">
-                <a16:creationId xmlns:a16="http://schemas.microsoft.com/office/drawing/2014/main" id="{AD29E078-2577-E44F-BC69-D4FED971DD1D}"/>
-              </a:ext>
-            </a:extLst>
-          </p:cNvPr>
-          <p:cNvSpPr/>
-          <p:nvPr/>
-        </p:nvSpPr>
-        <p:spPr>
-          <a:xfrm flipH="1">
-            <a:off x="7548542" y="3948146"/>
-            <a:ext cx="470067" cy="554967"/>
-          </a:xfrm>
-          <a:prstGeom prst="snip1Rect">
-            <a:avLst/>
-          </a:prstGeom>
-          <a:solidFill>
-            <a:schemeClr val="accent1">
-              <a:lumMod val="20000"/>
-              <a:lumOff val="80000"/>
-            </a:schemeClr>
-          </a:solidFill>
-          <a:ln>
-            <a:solidFill>
-              <a:schemeClr val="tx2"/>
-            </a:solidFill>
-          </a:ln>
-        </p:spPr>
-        <p:style>
-          <a:lnRef idx="2">
-            <a:schemeClr val="accent1">
-              <a:shade val="50000"/>
-            </a:schemeClr>
-          </a:lnRef>
-          <a:fillRef idx="1">
-            <a:schemeClr val="accent1"/>
-          </a:fillRef>
-          <a:effectRef idx="0">
-            <a:schemeClr val="accent1"/>
-          </a:effectRef>
-          <a:fontRef idx="minor">
-            <a:schemeClr val="lt1"/>
-          </a:fontRef>
-        </p:style>
-        <p:txBody>
-          <a:bodyPr rtlCol="0" anchor="ctr"/>
-          <a:lstStyle/>
-          <a:p>
-            <a:pPr algn="ctr"/>
-            <a:endParaRPr lang="en-CH"/>
-          </a:p>
-        </p:txBody>
-      </p:sp>
-      <p:sp>
-        <p:nvSpPr>
-          <p:cNvPr id="171" name="Right Triangle 170">
-            <a:extLst>
-              <a:ext uri="{FF2B5EF4-FFF2-40B4-BE49-F238E27FC236}">
-                <a16:creationId xmlns:a16="http://schemas.microsoft.com/office/drawing/2014/main" id="{6F0C247F-78C8-8D43-9484-54C2775CC522}"/>
-              </a:ext>
-            </a:extLst>
-          </p:cNvPr>
-          <p:cNvSpPr/>
-          <p:nvPr/>
-        </p:nvSpPr>
-        <p:spPr>
-          <a:xfrm rot="16200000">
-            <a:off x="7548542" y="3946075"/>
-            <a:ext cx="82831" cy="82831"/>
-          </a:xfrm>
-          <a:prstGeom prst="rtTriangle">
-            <a:avLst/>
-          </a:prstGeom>
-          <a:solidFill>
-            <a:schemeClr val="tx2"/>
-          </a:solidFill>
-          <a:ln>
-            <a:noFill/>
-          </a:ln>
-        </p:spPr>
-        <p:style>
-          <a:lnRef idx="2">
-            <a:schemeClr val="accent1">
-              <a:shade val="50000"/>
-            </a:schemeClr>
-          </a:lnRef>
-          <a:fillRef idx="1">
-            <a:schemeClr val="accent1"/>
-          </a:fillRef>
-          <a:effectRef idx="0">
-            <a:schemeClr val="accent1"/>
-          </a:effectRef>
-          <a:fontRef idx="minor">
-            <a:schemeClr val="lt1"/>
-          </a:fontRef>
-        </p:style>
-        <p:txBody>
-          <a:bodyPr rtlCol="0" anchor="ctr"/>
-          <a:lstStyle/>
-          <a:p>
-            <a:pPr algn="ctr"/>
-            <a:endParaRPr lang="en-CH"/>
-          </a:p>
-        </p:txBody>
-      </p:sp>
-      <p:sp>
-        <p:nvSpPr>
-          <p:cNvPr id="172" name="TextBox 171">
-            <a:extLst>
-              <a:ext uri="{FF2B5EF4-FFF2-40B4-BE49-F238E27FC236}">
-                <a16:creationId xmlns:a16="http://schemas.microsoft.com/office/drawing/2014/main" id="{122AFDFE-AD86-2E43-9DD3-7D8B666BDA8B}"/>
-              </a:ext>
-            </a:extLst>
-          </p:cNvPr>
-          <p:cNvSpPr txBox="1"/>
-          <p:nvPr/>
-        </p:nvSpPr>
-        <p:spPr>
-          <a:xfrm>
-            <a:off x="7554293" y="3995752"/>
-            <a:ext cx="487954" cy="338554"/>
-          </a:xfrm>
-          <a:prstGeom prst="rect">
-            <a:avLst/>
-          </a:prstGeom>
-          <a:noFill/>
-        </p:spPr>
-        <p:txBody>
-          <a:bodyPr wrap="none" rtlCol="0">
-            <a:spAutoFit/>
-          </a:bodyPr>
-          <a:lstStyle/>
-          <a:p>
-            <a:r>
-              <a:rPr lang="en-CH" sz="1600" b="1" dirty="0">
-                <a:solidFill>
-                  <a:schemeClr val="tx2"/>
-                </a:solidFill>
-              </a:rPr>
-              <a:t>JAR</a:t>
-            </a:r>
-            <a:endParaRPr lang="en-CH" sz="2600" b="1" dirty="0">
-              <a:solidFill>
-                <a:schemeClr val="tx2"/>
-              </a:solidFill>
-            </a:endParaRPr>
-          </a:p>
-        </p:txBody>
-      </p:sp>
-      <p:sp>
-        <p:nvSpPr>
-          <p:cNvPr id="173" name="Circular Arrow 172">
-            <a:extLst>
-              <a:ext uri="{FF2B5EF4-FFF2-40B4-BE49-F238E27FC236}">
-                <a16:creationId xmlns:a16="http://schemas.microsoft.com/office/drawing/2014/main" id="{92E83206-EE1A-1D4F-9108-B45E3E90BDEF}"/>
-              </a:ext>
-            </a:extLst>
-          </p:cNvPr>
-          <p:cNvSpPr/>
-          <p:nvPr/>
-        </p:nvSpPr>
-        <p:spPr>
-          <a:xfrm rot="9732450">
-            <a:off x="6539572" y="3177072"/>
-            <a:ext cx="1079501" cy="1079501"/>
-          </a:xfrm>
-          <a:prstGeom prst="circularArrow">
-            <a:avLst>
-              <a:gd name="adj1" fmla="val 5244"/>
-              <a:gd name="adj2" fmla="val 992223"/>
-              <a:gd name="adj3" fmla="val 20489948"/>
-              <a:gd name="adj4" fmla="val 13846572"/>
-              <a:gd name="adj5" fmla="val 8717"/>
-            </a:avLst>
-          </a:prstGeom>
-          <a:solidFill>
-            <a:schemeClr val="tx1">
-              <a:lumMod val="50000"/>
-              <a:lumOff val="50000"/>
-            </a:schemeClr>
-          </a:solidFill>
-          <a:ln>
-            <a:noFill/>
-          </a:ln>
-        </p:spPr>
-        <p:style>
-          <a:lnRef idx="2">
-            <a:schemeClr val="accent1">
-              <a:shade val="50000"/>
-            </a:schemeClr>
-          </a:lnRef>
-          <a:fillRef idx="1">
-            <a:schemeClr val="accent1"/>
-          </a:fillRef>
-          <a:effectRef idx="0">
-            <a:schemeClr val="accent1"/>
-          </a:effectRef>
-          <a:fontRef idx="minor">
-            <a:schemeClr val="lt1"/>
-          </a:fontRef>
-        </p:style>
-        <p:txBody>
-          <a:bodyPr rtlCol="0" anchor="ctr"/>
-          <a:lstStyle/>
-          <a:p>
-            <a:pPr algn="ctr"/>
-            <a:endParaRPr lang="en-CH">
-              <a:solidFill>
-                <a:schemeClr val="tx1"/>
-              </a:solidFill>
-            </a:endParaRPr>
-          </a:p>
-        </p:txBody>
-      </p:sp>
-      <p:sp>
-        <p:nvSpPr>
-          <p:cNvPr id="174" name="Circular Arrow 173">
-            <a:extLst>
-              <a:ext uri="{FF2B5EF4-FFF2-40B4-BE49-F238E27FC236}">
-                <a16:creationId xmlns:a16="http://schemas.microsoft.com/office/drawing/2014/main" id="{5E13DC80-24A2-4042-B859-47FBBD1BE771}"/>
-              </a:ext>
-            </a:extLst>
-          </p:cNvPr>
-          <p:cNvSpPr/>
-          <p:nvPr/>
-        </p:nvSpPr>
-        <p:spPr>
-          <a:xfrm rot="20532450">
-            <a:off x="6539572" y="3171365"/>
-            <a:ext cx="1079501" cy="1079501"/>
-          </a:xfrm>
-          <a:prstGeom prst="circularArrow">
-            <a:avLst>
-              <a:gd name="adj1" fmla="val 5244"/>
-              <a:gd name="adj2" fmla="val 992223"/>
-              <a:gd name="adj3" fmla="val 20489948"/>
-              <a:gd name="adj4" fmla="val 13846572"/>
-              <a:gd name="adj5" fmla="val 8717"/>
-            </a:avLst>
-          </a:prstGeom>
-          <a:solidFill>
-            <a:schemeClr val="tx1">
-              <a:lumMod val="50000"/>
-              <a:lumOff val="50000"/>
-            </a:schemeClr>
-          </a:solidFill>
-          <a:ln>
-            <a:noFill/>
-          </a:ln>
-        </p:spPr>
-        <p:style>
-          <a:lnRef idx="2">
-            <a:schemeClr val="accent1">
-              <a:shade val="50000"/>
-            </a:schemeClr>
-          </a:lnRef>
-          <a:fillRef idx="1">
-            <a:schemeClr val="accent1"/>
-          </a:fillRef>
-          <a:effectRef idx="0">
-            <a:schemeClr val="accent1"/>
-          </a:effectRef>
-          <a:fontRef idx="minor">
-            <a:schemeClr val="lt1"/>
-          </a:fontRef>
-        </p:style>
-        <p:txBody>
-          <a:bodyPr rtlCol="0" anchor="ctr"/>
-          <a:lstStyle/>
-          <a:p>
-            <a:pPr algn="ctr"/>
-            <a:endParaRPr lang="en-CH">
-              <a:solidFill>
-                <a:schemeClr val="tx1"/>
-              </a:solidFill>
-            </a:endParaRPr>
-          </a:p>
-        </p:txBody>
-      </p:sp>
-      <p:sp>
-        <p:nvSpPr>
-          <p:cNvPr id="179" name="Heart 178">
-            <a:extLst>
-              <a:ext uri="{FF2B5EF4-FFF2-40B4-BE49-F238E27FC236}">
-                <a16:creationId xmlns:a16="http://schemas.microsoft.com/office/drawing/2014/main" id="{2801DED1-9C59-BA46-9B7B-A91B3C8589E0}"/>
-              </a:ext>
-            </a:extLst>
-          </p:cNvPr>
-          <p:cNvSpPr/>
-          <p:nvPr/>
-        </p:nvSpPr>
-        <p:spPr>
-          <a:xfrm>
-            <a:off x="6765464" y="3500798"/>
-            <a:ext cx="627716" cy="499396"/>
-          </a:xfrm>
-          <a:prstGeom prst="heart">
-            <a:avLst/>
-          </a:prstGeom>
-          <a:solidFill>
-            <a:schemeClr val="bg1"/>
-          </a:solidFill>
-          <a:ln w="34925">
-            <a:solidFill>
-              <a:srgbClr val="C00000"/>
-            </a:solidFill>
-          </a:ln>
-        </p:spPr>
-        <p:style>
-          <a:lnRef idx="2">
-            <a:schemeClr val="accent1">
-              <a:shade val="50000"/>
-            </a:schemeClr>
-          </a:lnRef>
-          <a:fillRef idx="1">
-            <a:schemeClr val="accent1"/>
-          </a:fillRef>
-          <a:effectRef idx="0">
-            <a:schemeClr val="accent1"/>
-          </a:effectRef>
-          <a:fontRef idx="minor">
-            <a:schemeClr val="lt1"/>
-          </a:fontRef>
-        </p:style>
-        <p:txBody>
-          <a:bodyPr rtlCol="0" anchor="ctr"/>
-          <a:lstStyle/>
-          <a:p>
-            <a:pPr algn="ctr"/>
-            <a:endParaRPr lang="en-CH"/>
-          </a:p>
-        </p:txBody>
-      </p:sp>
-      <p:sp>
-        <p:nvSpPr>
-          <p:cNvPr id="178" name="Multiply 177">
-            <a:extLst>
-              <a:ext uri="{FF2B5EF4-FFF2-40B4-BE49-F238E27FC236}">
-                <a16:creationId xmlns:a16="http://schemas.microsoft.com/office/drawing/2014/main" id="{34B7B750-D875-3747-9F08-D2BB45DF7A77}"/>
-              </a:ext>
-            </a:extLst>
-          </p:cNvPr>
-          <p:cNvSpPr/>
-          <p:nvPr/>
-        </p:nvSpPr>
-        <p:spPr>
-          <a:xfrm rot="2700000">
-            <a:off x="9167952" y="3409988"/>
-            <a:ext cx="429969" cy="429969"/>
-          </a:xfrm>
-          <a:prstGeom prst="mathMultiply">
-            <a:avLst/>
-          </a:prstGeom>
-          <a:solidFill>
-            <a:srgbClr val="C00000"/>
-          </a:solidFill>
-          <a:ln w="0">
-            <a:solidFill>
-              <a:srgbClr val="C00000"/>
-            </a:solidFill>
-          </a:ln>
-        </p:spPr>
-        <p:style>
-          <a:lnRef idx="2">
-            <a:schemeClr val="accent2">
-              <a:shade val="50000"/>
-            </a:schemeClr>
-          </a:lnRef>
-          <a:fillRef idx="1">
-            <a:schemeClr val="accent2"/>
-          </a:fillRef>
-          <a:effectRef idx="0">
-            <a:schemeClr val="accent2"/>
-          </a:effectRef>
-          <a:fontRef idx="minor">
-            <a:schemeClr val="lt1"/>
-          </a:fontRef>
-        </p:style>
-        <p:txBody>
-          <a:bodyPr rtlCol="0" anchor="ctr"/>
-          <a:lstStyle/>
-          <a:p>
-            <a:pPr algn="ctr"/>
-            <a:endParaRPr lang="en-CH"/>
-          </a:p>
-        </p:txBody>
-      </p:sp>
-      <p:sp>
-        <p:nvSpPr>
-          <p:cNvPr id="184" name="Rectangle 183">
-            <a:extLst>
-              <a:ext uri="{FF2B5EF4-FFF2-40B4-BE49-F238E27FC236}">
-                <a16:creationId xmlns:a16="http://schemas.microsoft.com/office/drawing/2014/main" id="{9A62EEFD-C55C-6B47-9BA1-889415909FDD}"/>
-              </a:ext>
-            </a:extLst>
-          </p:cNvPr>
-          <p:cNvSpPr/>
-          <p:nvPr/>
-        </p:nvSpPr>
-        <p:spPr>
-          <a:xfrm>
-            <a:off x="7028948" y="3624972"/>
-            <a:ext cx="100748" cy="76200"/>
-          </a:xfrm>
-          <a:prstGeom prst="rect">
-            <a:avLst/>
-          </a:prstGeom>
-          <a:solidFill>
-            <a:schemeClr val="bg1"/>
-          </a:solidFill>
-          <a:ln>
-            <a:noFill/>
-          </a:ln>
-        </p:spPr>
-        <p:style>
-          <a:lnRef idx="2">
-            <a:schemeClr val="accent1">
-              <a:shade val="50000"/>
-            </a:schemeClr>
-          </a:lnRef>
-          <a:fillRef idx="1">
-            <a:schemeClr val="accent1"/>
-          </a:fillRef>
-          <a:effectRef idx="0">
-            <a:schemeClr val="accent1"/>
-          </a:effectRef>
-          <a:fontRef idx="minor">
-            <a:schemeClr val="lt1"/>
-          </a:fontRef>
-        </p:style>
-        <p:txBody>
-          <a:bodyPr rtlCol="0" anchor="ctr"/>
-          <a:lstStyle/>
-          <a:p>
-            <a:pPr algn="ctr"/>
-            <a:endParaRPr lang="en-CH"/>
-          </a:p>
-        </p:txBody>
-      </p:sp>
-      <p:sp>
-        <p:nvSpPr>
-          <p:cNvPr id="183" name="Freeform 182">
-            <a:extLst>
-              <a:ext uri="{FF2B5EF4-FFF2-40B4-BE49-F238E27FC236}">
-                <a16:creationId xmlns:a16="http://schemas.microsoft.com/office/drawing/2014/main" id="{37EE0209-F39B-7D4E-982E-AE4884409F38}"/>
-              </a:ext>
-            </a:extLst>
-          </p:cNvPr>
-          <p:cNvSpPr/>
-          <p:nvPr/>
-        </p:nvSpPr>
-        <p:spPr>
-          <a:xfrm>
-            <a:off x="6869987" y="3658975"/>
-            <a:ext cx="399680" cy="183041"/>
-          </a:xfrm>
-          <a:custGeom>
-            <a:avLst/>
-            <a:gdLst>
-              <a:gd name="connsiteX0" fmla="*/ 0 w 1152525"/>
-              <a:gd name="connsiteY0" fmla="*/ 336550 h 631825"/>
-              <a:gd name="connsiteX1" fmla="*/ 190500 w 1152525"/>
-              <a:gd name="connsiteY1" fmla="*/ 336550 h 631825"/>
-              <a:gd name="connsiteX2" fmla="*/ 269875 w 1152525"/>
-              <a:gd name="connsiteY2" fmla="*/ 622300 h 631825"/>
-              <a:gd name="connsiteX3" fmla="*/ 406400 w 1152525"/>
-              <a:gd name="connsiteY3" fmla="*/ 12700 h 631825"/>
-              <a:gd name="connsiteX4" fmla="*/ 476250 w 1152525"/>
-              <a:gd name="connsiteY4" fmla="*/ 342900 h 631825"/>
-              <a:gd name="connsiteX5" fmla="*/ 714375 w 1152525"/>
-              <a:gd name="connsiteY5" fmla="*/ 342900 h 631825"/>
-              <a:gd name="connsiteX6" fmla="*/ 781050 w 1152525"/>
-              <a:gd name="connsiteY6" fmla="*/ 631825 h 631825"/>
-              <a:gd name="connsiteX7" fmla="*/ 914400 w 1152525"/>
-              <a:gd name="connsiteY7" fmla="*/ 0 h 631825"/>
-              <a:gd name="connsiteX8" fmla="*/ 996950 w 1152525"/>
-              <a:gd name="connsiteY8" fmla="*/ 352425 h 631825"/>
-              <a:gd name="connsiteX9" fmla="*/ 1152525 w 1152525"/>
-              <a:gd name="connsiteY9" fmla="*/ 352425 h 631825"/>
-            </a:gdLst>
-            <a:ahLst/>
-            <a:cxnLst>
-              <a:cxn ang="0">
-                <a:pos x="connsiteX0" y="connsiteY0"/>
-              </a:cxn>
-              <a:cxn ang="0">
-                <a:pos x="connsiteX1" y="connsiteY1"/>
-              </a:cxn>
-              <a:cxn ang="0">
-                <a:pos x="connsiteX2" y="connsiteY2"/>
-              </a:cxn>
-              <a:cxn ang="0">
-                <a:pos x="connsiteX3" y="connsiteY3"/>
-              </a:cxn>
-              <a:cxn ang="0">
-                <a:pos x="connsiteX4" y="connsiteY4"/>
-              </a:cxn>
-              <a:cxn ang="0">
-                <a:pos x="connsiteX5" y="connsiteY5"/>
-              </a:cxn>
-              <a:cxn ang="0">
-                <a:pos x="connsiteX6" y="connsiteY6"/>
-              </a:cxn>
-              <a:cxn ang="0">
-                <a:pos x="connsiteX7" y="connsiteY7"/>
-              </a:cxn>
-              <a:cxn ang="0">
-                <a:pos x="connsiteX8" y="connsiteY8"/>
-              </a:cxn>
-              <a:cxn ang="0">
-                <a:pos x="connsiteX9" y="connsiteY9"/>
-              </a:cxn>
-            </a:cxnLst>
-            <a:rect l="l" t="t" r="r" b="b"/>
-            <a:pathLst>
-              <a:path w="1152525" h="631825">
-                <a:moveTo>
-                  <a:pt x="0" y="336550"/>
-                </a:moveTo>
-                <a:lnTo>
-                  <a:pt x="190500" y="336550"/>
-                </a:lnTo>
-                <a:lnTo>
-                  <a:pt x="269875" y="622300"/>
-                </a:lnTo>
-                <a:lnTo>
-                  <a:pt x="406400" y="12700"/>
-                </a:lnTo>
-                <a:lnTo>
-                  <a:pt x="476250" y="342900"/>
-                </a:lnTo>
-                <a:lnTo>
-                  <a:pt x="714375" y="342900"/>
-                </a:lnTo>
-                <a:lnTo>
-                  <a:pt x="781050" y="631825"/>
-                </a:lnTo>
-                <a:lnTo>
-                  <a:pt x="914400" y="0"/>
-                </a:lnTo>
-                <a:lnTo>
-                  <a:pt x="996950" y="352425"/>
-                </a:lnTo>
-                <a:lnTo>
-                  <a:pt x="1152525" y="352425"/>
-                </a:lnTo>
-              </a:path>
-            </a:pathLst>
-          </a:custGeom>
-          <a:noFill/>
-          <a:ln w="25400">
-            <a:solidFill>
-              <a:schemeClr val="tx1">
-                <a:lumMod val="75000"/>
-                <a:lumOff val="25000"/>
-              </a:schemeClr>
-            </a:solidFill>
-            <a:bevel/>
-          </a:ln>
-        </p:spPr>
-        <p:style>
-          <a:lnRef idx="2">
-            <a:schemeClr val="accent1">
-              <a:shade val="50000"/>
-            </a:schemeClr>
-          </a:lnRef>
-          <a:fillRef idx="1">
-            <a:schemeClr val="accent1"/>
-          </a:fillRef>
-          <a:effectRef idx="0">
-            <a:schemeClr val="accent1"/>
-          </a:effectRef>
-          <a:fontRef idx="minor">
-            <a:schemeClr val="lt1"/>
-          </a:fontRef>
-        </p:style>
-        <p:txBody>
-          <a:bodyPr rtlCol="0" anchor="ctr"/>
-          <a:lstStyle/>
-          <a:p>
-            <a:pPr algn="ctr"/>
-            <a:endParaRPr lang="en-CH"/>
-          </a:p>
-        </p:txBody>
-      </p:sp>
       <p:grpSp>
         <p:nvGrpSpPr>
           <p:cNvPr id="186" name="Group 185">
@@ -9667,6 +7554,926 @@
           </a:p>
         </p:txBody>
       </p:sp>
+      <p:sp>
+        <p:nvSpPr>
+          <p:cNvPr id="135" name="Rectangle 134">
+            <a:extLst>
+              <a:ext uri="{FF2B5EF4-FFF2-40B4-BE49-F238E27FC236}">
+                <a16:creationId xmlns:a16="http://schemas.microsoft.com/office/drawing/2014/main" id="{D2DA9A37-C993-E94C-A448-6F342E176764}"/>
+              </a:ext>
+            </a:extLst>
+          </p:cNvPr>
+          <p:cNvSpPr/>
+          <p:nvPr/>
+        </p:nvSpPr>
+        <p:spPr>
+          <a:xfrm>
+            <a:off x="5207553" y="750456"/>
+            <a:ext cx="3600000" cy="1800000"/>
+          </a:xfrm>
+          <a:prstGeom prst="rect">
+            <a:avLst/>
+          </a:prstGeom>
+          <a:solidFill>
+            <a:schemeClr val="bg1">
+              <a:lumMod val="85000"/>
+            </a:schemeClr>
+          </a:solidFill>
+          <a:ln w="3175"/>
+        </p:spPr>
+        <p:style>
+          <a:lnRef idx="2">
+            <a:schemeClr val="accent1">
+              <a:shade val="50000"/>
+            </a:schemeClr>
+          </a:lnRef>
+          <a:fillRef idx="1">
+            <a:schemeClr val="accent1"/>
+          </a:fillRef>
+          <a:effectRef idx="0">
+            <a:schemeClr val="accent1"/>
+          </a:effectRef>
+          <a:fontRef idx="minor">
+            <a:schemeClr val="lt1"/>
+          </a:fontRef>
+        </p:style>
+        <p:txBody>
+          <a:bodyPr rtlCol="0" anchor="ctr"/>
+          <a:lstStyle/>
+          <a:p>
+            <a:pPr algn="ctr"/>
+            <a:endParaRPr lang="en-CH" dirty="0"/>
+          </a:p>
+        </p:txBody>
+      </p:sp>
+      <p:grpSp>
+        <p:nvGrpSpPr>
+          <p:cNvPr id="136" name="Group 135">
+            <a:extLst>
+              <a:ext uri="{FF2B5EF4-FFF2-40B4-BE49-F238E27FC236}">
+                <a16:creationId xmlns:a16="http://schemas.microsoft.com/office/drawing/2014/main" id="{D5BFB2FE-858B-0741-9FCB-B7A8DE49684E}"/>
+              </a:ext>
+            </a:extLst>
+          </p:cNvPr>
+          <p:cNvGrpSpPr/>
+          <p:nvPr/>
+        </p:nvGrpSpPr>
+        <p:grpSpPr>
+          <a:xfrm>
+            <a:off x="5527168" y="986742"/>
+            <a:ext cx="1111093" cy="1316670"/>
+            <a:chOff x="1617057" y="1225775"/>
+            <a:chExt cx="720725" cy="854075"/>
+          </a:xfrm>
+        </p:grpSpPr>
+        <p:sp>
+          <p:nvSpPr>
+            <p:cNvPr id="137" name="Snip Single Corner Rectangle 136">
+              <a:extLst>
+                <a:ext uri="{FF2B5EF4-FFF2-40B4-BE49-F238E27FC236}">
+                  <a16:creationId xmlns:a16="http://schemas.microsoft.com/office/drawing/2014/main" id="{2C4D13F3-2AE9-324F-AF2E-D2BBBCA1B6F9}"/>
+                </a:ext>
+              </a:extLst>
+            </p:cNvPr>
+            <p:cNvSpPr/>
+            <p:nvPr/>
+          </p:nvSpPr>
+          <p:spPr>
+            <a:xfrm flipH="1">
+              <a:off x="1617057" y="1228950"/>
+              <a:ext cx="720725" cy="850900"/>
+            </a:xfrm>
+            <a:prstGeom prst="snip1Rect">
+              <a:avLst/>
+            </a:prstGeom>
+            <a:solidFill>
+              <a:schemeClr val="accent1">
+                <a:lumMod val="40000"/>
+                <a:lumOff val="60000"/>
+              </a:schemeClr>
+            </a:solidFill>
+          </p:spPr>
+          <p:style>
+            <a:lnRef idx="2">
+              <a:schemeClr val="accent1">
+                <a:shade val="50000"/>
+              </a:schemeClr>
+            </a:lnRef>
+            <a:fillRef idx="1">
+              <a:schemeClr val="accent1"/>
+            </a:fillRef>
+            <a:effectRef idx="0">
+              <a:schemeClr val="accent1"/>
+            </a:effectRef>
+            <a:fontRef idx="minor">
+              <a:schemeClr val="lt1"/>
+            </a:fontRef>
+          </p:style>
+          <p:txBody>
+            <a:bodyPr rtlCol="0" anchor="ctr"/>
+            <a:lstStyle/>
+            <a:p>
+              <a:pPr algn="ctr"/>
+              <a:endParaRPr lang="en-CH"/>
+            </a:p>
+          </p:txBody>
+        </p:sp>
+        <p:sp>
+          <p:nvSpPr>
+            <p:cNvPr id="138" name="Right Triangle 137">
+              <a:extLst>
+                <a:ext uri="{FF2B5EF4-FFF2-40B4-BE49-F238E27FC236}">
+                  <a16:creationId xmlns:a16="http://schemas.microsoft.com/office/drawing/2014/main" id="{8938E82B-7189-0244-842A-3A0E2ECE52AF}"/>
+                </a:ext>
+              </a:extLst>
+            </p:cNvPr>
+            <p:cNvSpPr/>
+            <p:nvPr/>
+          </p:nvSpPr>
+          <p:spPr>
+            <a:xfrm rot="16200000">
+              <a:off x="1617057" y="1225775"/>
+              <a:ext cx="127000" cy="127000"/>
+            </a:xfrm>
+            <a:prstGeom prst="rtTriangle">
+              <a:avLst/>
+            </a:prstGeom>
+            <a:solidFill>
+              <a:schemeClr val="accent1">
+                <a:lumMod val="75000"/>
+              </a:schemeClr>
+            </a:solidFill>
+            <a:ln>
+              <a:noFill/>
+            </a:ln>
+          </p:spPr>
+          <p:style>
+            <a:lnRef idx="2">
+              <a:schemeClr val="accent1">
+                <a:shade val="50000"/>
+              </a:schemeClr>
+            </a:lnRef>
+            <a:fillRef idx="1">
+              <a:schemeClr val="accent1"/>
+            </a:fillRef>
+            <a:effectRef idx="0">
+              <a:schemeClr val="accent1"/>
+            </a:effectRef>
+            <a:fontRef idx="minor">
+              <a:schemeClr val="lt1"/>
+            </a:fontRef>
+          </p:style>
+          <p:txBody>
+            <a:bodyPr rtlCol="0" anchor="ctr"/>
+            <a:lstStyle/>
+            <a:p>
+              <a:pPr algn="ctr"/>
+              <a:endParaRPr lang="en-CH"/>
+            </a:p>
+          </p:txBody>
+        </p:sp>
+      </p:grpSp>
+      <p:grpSp>
+        <p:nvGrpSpPr>
+          <p:cNvPr id="143" name="Group 142">
+            <a:extLst>
+              <a:ext uri="{FF2B5EF4-FFF2-40B4-BE49-F238E27FC236}">
+                <a16:creationId xmlns:a16="http://schemas.microsoft.com/office/drawing/2014/main" id="{CCA52CD9-CBEF-2A47-8817-E1B0932DD497}"/>
+              </a:ext>
+            </a:extLst>
+          </p:cNvPr>
+          <p:cNvGrpSpPr/>
+          <p:nvPr/>
+        </p:nvGrpSpPr>
+        <p:grpSpPr>
+          <a:xfrm>
+            <a:off x="7376845" y="985712"/>
+            <a:ext cx="1111093" cy="1316670"/>
+            <a:chOff x="1617057" y="1225775"/>
+            <a:chExt cx="720725" cy="854075"/>
+          </a:xfrm>
+        </p:grpSpPr>
+        <p:sp>
+          <p:nvSpPr>
+            <p:cNvPr id="144" name="Snip Single Corner Rectangle 143">
+              <a:extLst>
+                <a:ext uri="{FF2B5EF4-FFF2-40B4-BE49-F238E27FC236}">
+                  <a16:creationId xmlns:a16="http://schemas.microsoft.com/office/drawing/2014/main" id="{1896A00B-78EB-4844-A931-3C254924F338}"/>
+                </a:ext>
+              </a:extLst>
+            </p:cNvPr>
+            <p:cNvSpPr/>
+            <p:nvPr/>
+          </p:nvSpPr>
+          <p:spPr>
+            <a:xfrm flipH="1">
+              <a:off x="1617057" y="1228950"/>
+              <a:ext cx="720725" cy="850900"/>
+            </a:xfrm>
+            <a:prstGeom prst="snip1Rect">
+              <a:avLst/>
+            </a:prstGeom>
+            <a:solidFill>
+              <a:schemeClr val="accent1">
+                <a:lumMod val="40000"/>
+                <a:lumOff val="60000"/>
+              </a:schemeClr>
+            </a:solidFill>
+          </p:spPr>
+          <p:style>
+            <a:lnRef idx="2">
+              <a:schemeClr val="accent1">
+                <a:shade val="50000"/>
+              </a:schemeClr>
+            </a:lnRef>
+            <a:fillRef idx="1">
+              <a:schemeClr val="accent1"/>
+            </a:fillRef>
+            <a:effectRef idx="0">
+              <a:schemeClr val="accent1"/>
+            </a:effectRef>
+            <a:fontRef idx="minor">
+              <a:schemeClr val="lt1"/>
+            </a:fontRef>
+          </p:style>
+          <p:txBody>
+            <a:bodyPr rtlCol="0" anchor="ctr"/>
+            <a:lstStyle/>
+            <a:p>
+              <a:pPr algn="ctr"/>
+              <a:endParaRPr lang="en-CH"/>
+            </a:p>
+          </p:txBody>
+        </p:sp>
+        <p:sp>
+          <p:nvSpPr>
+            <p:cNvPr id="145" name="Right Triangle 144">
+              <a:extLst>
+                <a:ext uri="{FF2B5EF4-FFF2-40B4-BE49-F238E27FC236}">
+                  <a16:creationId xmlns:a16="http://schemas.microsoft.com/office/drawing/2014/main" id="{8D8ED39D-1BC8-4449-82A3-56512273D85B}"/>
+                </a:ext>
+              </a:extLst>
+            </p:cNvPr>
+            <p:cNvSpPr/>
+            <p:nvPr/>
+          </p:nvSpPr>
+          <p:spPr>
+            <a:xfrm rot="16200000">
+              <a:off x="1617057" y="1225775"/>
+              <a:ext cx="127000" cy="127000"/>
+            </a:xfrm>
+            <a:prstGeom prst="rtTriangle">
+              <a:avLst/>
+            </a:prstGeom>
+            <a:solidFill>
+              <a:schemeClr val="accent1">
+                <a:lumMod val="75000"/>
+              </a:schemeClr>
+            </a:solidFill>
+            <a:ln>
+              <a:noFill/>
+            </a:ln>
+          </p:spPr>
+          <p:style>
+            <a:lnRef idx="2">
+              <a:schemeClr val="accent1">
+                <a:shade val="50000"/>
+              </a:schemeClr>
+            </a:lnRef>
+            <a:fillRef idx="1">
+              <a:schemeClr val="accent1"/>
+            </a:fillRef>
+            <a:effectRef idx="0">
+              <a:schemeClr val="accent1"/>
+            </a:effectRef>
+            <a:fontRef idx="minor">
+              <a:schemeClr val="lt1"/>
+            </a:fontRef>
+          </p:style>
+          <p:txBody>
+            <a:bodyPr rtlCol="0" anchor="ctr"/>
+            <a:lstStyle/>
+            <a:p>
+              <a:pPr algn="ctr"/>
+              <a:endParaRPr lang="en-CH"/>
+            </a:p>
+          </p:txBody>
+        </p:sp>
+      </p:grpSp>
+      <p:sp>
+        <p:nvSpPr>
+          <p:cNvPr id="154" name="TextBox 153">
+            <a:extLst>
+              <a:ext uri="{FF2B5EF4-FFF2-40B4-BE49-F238E27FC236}">
+                <a16:creationId xmlns:a16="http://schemas.microsoft.com/office/drawing/2014/main" id="{984830FE-7E5D-2340-B700-AABDD8868CE4}"/>
+              </a:ext>
+            </a:extLst>
+          </p:cNvPr>
+          <p:cNvSpPr txBox="1"/>
+          <p:nvPr/>
+        </p:nvSpPr>
+        <p:spPr>
+          <a:xfrm>
+            <a:off x="7800425" y="1614297"/>
+            <a:ext cx="636713" cy="646331"/>
+          </a:xfrm>
+          <a:prstGeom prst="rect">
+            <a:avLst/>
+          </a:prstGeom>
+          <a:noFill/>
+        </p:spPr>
+        <p:txBody>
+          <a:bodyPr wrap="none" rtlCol="0">
+            <a:spAutoFit/>
+          </a:bodyPr>
+          <a:lstStyle/>
+          <a:p>
+            <a:r>
+              <a:rPr lang="en-CH" sz="3600" b="1" dirty="0">
+                <a:solidFill>
+                  <a:schemeClr val="tx2"/>
+                </a:solidFill>
+              </a:rPr>
+              <a:t>v2</a:t>
+            </a:r>
+            <a:endParaRPr lang="en-CH" sz="2800" b="1" dirty="0">
+              <a:solidFill>
+                <a:schemeClr val="tx2"/>
+              </a:solidFill>
+            </a:endParaRPr>
+          </a:p>
+        </p:txBody>
+      </p:sp>
+      <p:sp>
+        <p:nvSpPr>
+          <p:cNvPr id="155" name="TextBox 154">
+            <a:extLst>
+              <a:ext uri="{FF2B5EF4-FFF2-40B4-BE49-F238E27FC236}">
+                <a16:creationId xmlns:a16="http://schemas.microsoft.com/office/drawing/2014/main" id="{85B78E3A-74E7-774A-9BBB-44622D770318}"/>
+              </a:ext>
+            </a:extLst>
+          </p:cNvPr>
+          <p:cNvSpPr txBox="1"/>
+          <p:nvPr/>
+        </p:nvSpPr>
+        <p:spPr>
+          <a:xfrm>
+            <a:off x="5627562" y="1614297"/>
+            <a:ext cx="636713" cy="646331"/>
+          </a:xfrm>
+          <a:prstGeom prst="rect">
+            <a:avLst/>
+          </a:prstGeom>
+          <a:noFill/>
+        </p:spPr>
+        <p:txBody>
+          <a:bodyPr wrap="none" rtlCol="0">
+            <a:spAutoFit/>
+          </a:bodyPr>
+          <a:lstStyle/>
+          <a:p>
+            <a:r>
+              <a:rPr lang="en-CH" sz="3600" b="1" dirty="0">
+                <a:solidFill>
+                  <a:schemeClr val="tx2"/>
+                </a:solidFill>
+              </a:rPr>
+              <a:t>v1</a:t>
+            </a:r>
+            <a:endParaRPr lang="en-CH" sz="2800" b="1" dirty="0">
+              <a:solidFill>
+                <a:schemeClr val="tx2"/>
+              </a:solidFill>
+            </a:endParaRPr>
+          </a:p>
+        </p:txBody>
+      </p:sp>
+      <p:sp>
+        <p:nvSpPr>
+          <p:cNvPr id="161" name="Rectangle 160">
+            <a:extLst>
+              <a:ext uri="{FF2B5EF4-FFF2-40B4-BE49-F238E27FC236}">
+                <a16:creationId xmlns:a16="http://schemas.microsoft.com/office/drawing/2014/main" id="{8173131B-3D98-9947-929C-1280CFD3D1AB}"/>
+              </a:ext>
+            </a:extLst>
+          </p:cNvPr>
+          <p:cNvSpPr/>
+          <p:nvPr/>
+        </p:nvSpPr>
+        <p:spPr>
+          <a:xfrm>
+            <a:off x="6303025" y="1685105"/>
+            <a:ext cx="1466850" cy="688975"/>
+          </a:xfrm>
+          <a:prstGeom prst="rect">
+            <a:avLst/>
+          </a:prstGeom>
+          <a:solidFill>
+            <a:schemeClr val="bg1"/>
+          </a:solidFill>
+        </p:spPr>
+        <p:style>
+          <a:lnRef idx="2">
+            <a:schemeClr val="accent1">
+              <a:shade val="50000"/>
+            </a:schemeClr>
+          </a:lnRef>
+          <a:fillRef idx="1">
+            <a:schemeClr val="accent1"/>
+          </a:fillRef>
+          <a:effectRef idx="0">
+            <a:schemeClr val="accent1"/>
+          </a:effectRef>
+          <a:fontRef idx="minor">
+            <a:schemeClr val="lt1"/>
+          </a:fontRef>
+        </p:style>
+        <p:txBody>
+          <a:bodyPr rtlCol="0" anchor="ctr"/>
+          <a:lstStyle/>
+          <a:p>
+            <a:pPr algn="ctr"/>
+            <a:endParaRPr lang="en-CH" dirty="0"/>
+          </a:p>
+        </p:txBody>
+      </p:sp>
+      <p:sp>
+        <p:nvSpPr>
+          <p:cNvPr id="177" name="TextBox 176">
+            <a:extLst>
+              <a:ext uri="{FF2B5EF4-FFF2-40B4-BE49-F238E27FC236}">
+                <a16:creationId xmlns:a16="http://schemas.microsoft.com/office/drawing/2014/main" id="{F9639B2A-4FEC-5D4B-8621-EE602CDCDE14}"/>
+              </a:ext>
+            </a:extLst>
+          </p:cNvPr>
+          <p:cNvSpPr txBox="1"/>
+          <p:nvPr/>
+        </p:nvSpPr>
+        <p:spPr>
+          <a:xfrm>
+            <a:off x="6327354" y="1973485"/>
+            <a:ext cx="184731" cy="369332"/>
+          </a:xfrm>
+          <a:prstGeom prst="rect">
+            <a:avLst/>
+          </a:prstGeom>
+          <a:noFill/>
+        </p:spPr>
+        <p:txBody>
+          <a:bodyPr wrap="none" rtlCol="0">
+            <a:spAutoFit/>
+          </a:bodyPr>
+          <a:lstStyle/>
+          <a:p>
+            <a:pPr algn="ctr"/>
+            <a:endParaRPr lang="en-CH" b="1" dirty="0">
+              <a:solidFill>
+                <a:schemeClr val="accent6">
+                  <a:lumMod val="75000"/>
+                </a:schemeClr>
+              </a:solidFill>
+            </a:endParaRPr>
+          </a:p>
+        </p:txBody>
+      </p:sp>
+      <p:sp>
+        <p:nvSpPr>
+          <p:cNvPr id="180" name="TextBox 179">
+            <a:extLst>
+              <a:ext uri="{FF2B5EF4-FFF2-40B4-BE49-F238E27FC236}">
+                <a16:creationId xmlns:a16="http://schemas.microsoft.com/office/drawing/2014/main" id="{CE2C1715-2A15-D744-9581-7BD9DA6AFE07}"/>
+              </a:ext>
+            </a:extLst>
+          </p:cNvPr>
+          <p:cNvSpPr txBox="1"/>
+          <p:nvPr/>
+        </p:nvSpPr>
+        <p:spPr>
+          <a:xfrm>
+            <a:off x="6327324" y="1609283"/>
+            <a:ext cx="184730" cy="461665"/>
+          </a:xfrm>
+          <a:prstGeom prst="rect">
+            <a:avLst/>
+          </a:prstGeom>
+          <a:noFill/>
+        </p:spPr>
+        <p:txBody>
+          <a:bodyPr wrap="none" rtlCol="0">
+            <a:spAutoFit/>
+          </a:bodyPr>
+          <a:lstStyle/>
+          <a:p>
+            <a:pPr algn="ctr"/>
+            <a:endParaRPr lang="en-CH" sz="2400" dirty="0">
+              <a:solidFill>
+                <a:srgbClr val="C00000"/>
+              </a:solidFill>
+            </a:endParaRPr>
+          </a:p>
+        </p:txBody>
+      </p:sp>
+      <p:sp>
+        <p:nvSpPr>
+          <p:cNvPr id="181" name="Rectangle 180">
+            <a:extLst>
+              <a:ext uri="{FF2B5EF4-FFF2-40B4-BE49-F238E27FC236}">
+                <a16:creationId xmlns:a16="http://schemas.microsoft.com/office/drawing/2014/main" id="{FC75FF9F-BA1E-5A4E-8427-DB0413F0F292}"/>
+              </a:ext>
+            </a:extLst>
+          </p:cNvPr>
+          <p:cNvSpPr/>
+          <p:nvPr/>
+        </p:nvSpPr>
+        <p:spPr>
+          <a:xfrm>
+            <a:off x="6648976" y="1778839"/>
+            <a:ext cx="374595" cy="229822"/>
+          </a:xfrm>
+          <a:prstGeom prst="rect">
+            <a:avLst/>
+          </a:prstGeom>
+          <a:solidFill>
+            <a:schemeClr val="accent6">
+              <a:lumMod val="75000"/>
+              <a:alpha val="30000"/>
+            </a:schemeClr>
+          </a:solidFill>
+          <a:ln>
+            <a:noFill/>
+          </a:ln>
+        </p:spPr>
+        <p:style>
+          <a:lnRef idx="2">
+            <a:schemeClr val="accent1">
+              <a:shade val="50000"/>
+            </a:schemeClr>
+          </a:lnRef>
+          <a:fillRef idx="1">
+            <a:schemeClr val="accent1"/>
+          </a:fillRef>
+          <a:effectRef idx="0">
+            <a:schemeClr val="accent1"/>
+          </a:effectRef>
+          <a:fontRef idx="minor">
+            <a:schemeClr val="lt1"/>
+          </a:fontRef>
+        </p:style>
+        <p:txBody>
+          <a:bodyPr rtlCol="0" anchor="ctr"/>
+          <a:lstStyle/>
+          <a:p>
+            <a:pPr algn="ctr"/>
+            <a:endParaRPr lang="en-CH"/>
+          </a:p>
+        </p:txBody>
+      </p:sp>
+      <p:sp>
+        <p:nvSpPr>
+          <p:cNvPr id="182" name="Rectangle 181">
+            <a:extLst>
+              <a:ext uri="{FF2B5EF4-FFF2-40B4-BE49-F238E27FC236}">
+                <a16:creationId xmlns:a16="http://schemas.microsoft.com/office/drawing/2014/main" id="{AF69A6E5-8D3F-3E4F-9D9E-27ADFE5B4E0F}"/>
+              </a:ext>
+            </a:extLst>
+          </p:cNvPr>
+          <p:cNvSpPr/>
+          <p:nvPr/>
+        </p:nvSpPr>
+        <p:spPr>
+          <a:xfrm>
+            <a:off x="7398153" y="2052998"/>
+            <a:ext cx="261331" cy="229822"/>
+          </a:xfrm>
+          <a:prstGeom prst="rect">
+            <a:avLst/>
+          </a:prstGeom>
+          <a:solidFill>
+            <a:srgbClr val="C00000">
+              <a:alpha val="30000"/>
+            </a:srgbClr>
+          </a:solidFill>
+          <a:ln>
+            <a:noFill/>
+          </a:ln>
+        </p:spPr>
+        <p:style>
+          <a:lnRef idx="2">
+            <a:schemeClr val="accent1">
+              <a:shade val="50000"/>
+            </a:schemeClr>
+          </a:lnRef>
+          <a:fillRef idx="1">
+            <a:schemeClr val="accent1"/>
+          </a:fillRef>
+          <a:effectRef idx="0">
+            <a:schemeClr val="accent1"/>
+          </a:effectRef>
+          <a:fontRef idx="minor">
+            <a:schemeClr val="lt1"/>
+          </a:fontRef>
+        </p:style>
+        <p:txBody>
+          <a:bodyPr rtlCol="0" anchor="ctr"/>
+          <a:lstStyle/>
+          <a:p>
+            <a:pPr algn="ctr"/>
+            <a:endParaRPr lang="en-CH"/>
+          </a:p>
+        </p:txBody>
+      </p:sp>
+      <p:sp>
+        <p:nvSpPr>
+          <p:cNvPr id="199" name="TextBox 198">
+            <a:extLst>
+              <a:ext uri="{FF2B5EF4-FFF2-40B4-BE49-F238E27FC236}">
+                <a16:creationId xmlns:a16="http://schemas.microsoft.com/office/drawing/2014/main" id="{FBB2106E-42DA-9C4F-B601-CD7CFF60EC07}"/>
+              </a:ext>
+            </a:extLst>
+          </p:cNvPr>
+          <p:cNvSpPr txBox="1"/>
+          <p:nvPr/>
+        </p:nvSpPr>
+        <p:spPr>
+          <a:xfrm>
+            <a:off x="6310585" y="1706168"/>
+            <a:ext cx="1451038" cy="646331"/>
+          </a:xfrm>
+          <a:prstGeom prst="rect">
+            <a:avLst/>
+          </a:prstGeom>
+          <a:noFill/>
+        </p:spPr>
+        <p:txBody>
+          <a:bodyPr wrap="none" rtlCol="0">
+            <a:spAutoFit/>
+          </a:bodyPr>
+          <a:lstStyle/>
+          <a:p>
+            <a:r>
+              <a:rPr lang="en-CH" b="1" dirty="0">
+                <a:solidFill>
+                  <a:schemeClr val="tx1">
+                    <a:lumMod val="75000"/>
+                    <a:lumOff val="25000"/>
+                  </a:schemeClr>
+                </a:solidFill>
+                <a:latin typeface="Consolas" panose="020B0609020204030204" pitchFamily="49" charset="0"/>
+                <a:cs typeface="Consolas" panose="020B0609020204030204" pitchFamily="49" charset="0"/>
+              </a:rPr>
+              <a:t>0x</a:t>
+            </a:r>
+            <a:r>
+              <a:rPr lang="en-CH" b="1" dirty="0">
+                <a:solidFill>
+                  <a:schemeClr val="accent6">
+                    <a:lumMod val="75000"/>
+                  </a:schemeClr>
+                </a:solidFill>
+                <a:latin typeface="Consolas" panose="020B0609020204030204" pitchFamily="49" charset="0"/>
+                <a:cs typeface="Consolas" panose="020B0609020204030204" pitchFamily="49" charset="0"/>
+              </a:rPr>
+              <a:t>CAF</a:t>
+            </a:r>
+            <a:r>
+              <a:rPr lang="en-CH" b="1" dirty="0">
+                <a:solidFill>
+                  <a:schemeClr val="tx1">
+                    <a:lumMod val="75000"/>
+                    <a:lumOff val="25000"/>
+                  </a:schemeClr>
+                </a:solidFill>
+                <a:latin typeface="Consolas" panose="020B0609020204030204" pitchFamily="49" charset="0"/>
+                <a:cs typeface="Consolas" panose="020B0609020204030204" pitchFamily="49" charset="0"/>
+              </a:rPr>
+              <a:t>EBABE</a:t>
+            </a:r>
+            <a:br>
+              <a:rPr lang="en-CH" b="1" dirty="0">
+                <a:solidFill>
+                  <a:schemeClr val="tx1">
+                    <a:lumMod val="75000"/>
+                    <a:lumOff val="25000"/>
+                  </a:schemeClr>
+                </a:solidFill>
+                <a:latin typeface="Consolas" panose="020B0609020204030204" pitchFamily="49" charset="0"/>
+                <a:cs typeface="Consolas" panose="020B0609020204030204" pitchFamily="49" charset="0"/>
+              </a:rPr>
+            </a:br>
+            <a:r>
+              <a:rPr lang="en-CH" b="1" dirty="0">
+                <a:solidFill>
+                  <a:schemeClr val="tx1">
+                    <a:lumMod val="75000"/>
+                    <a:lumOff val="25000"/>
+                  </a:schemeClr>
+                </a:solidFill>
+                <a:latin typeface="Consolas" panose="020B0609020204030204" pitchFamily="49" charset="0"/>
+                <a:cs typeface="Consolas" panose="020B0609020204030204" pitchFamily="49" charset="0"/>
+              </a:rPr>
+              <a:t>0x240219</a:t>
+            </a:r>
+            <a:r>
+              <a:rPr lang="en-CH" b="1" dirty="0">
+                <a:solidFill>
+                  <a:srgbClr val="C00000"/>
+                </a:solidFill>
+                <a:latin typeface="Consolas" panose="020B0609020204030204" pitchFamily="49" charset="0"/>
+                <a:cs typeface="Consolas" panose="020B0609020204030204" pitchFamily="49" charset="0"/>
+              </a:rPr>
+              <a:t>77</a:t>
+            </a:r>
+          </a:p>
+        </p:txBody>
+      </p:sp>
+      <p:sp>
+        <p:nvSpPr>
+          <p:cNvPr id="200" name="Left-Right Arrow 199">
+            <a:extLst>
+              <a:ext uri="{FF2B5EF4-FFF2-40B4-BE49-F238E27FC236}">
+                <a16:creationId xmlns:a16="http://schemas.microsoft.com/office/drawing/2014/main" id="{7291A5D0-B1EB-0A49-9165-ED1606E17596}"/>
+              </a:ext>
+            </a:extLst>
+          </p:cNvPr>
+          <p:cNvSpPr/>
+          <p:nvPr/>
+        </p:nvSpPr>
+        <p:spPr>
+          <a:xfrm>
+            <a:off x="6649592" y="1143071"/>
+            <a:ext cx="712167" cy="482108"/>
+          </a:xfrm>
+          <a:prstGeom prst="leftRightArrow">
+            <a:avLst>
+              <a:gd name="adj1" fmla="val 59220"/>
+              <a:gd name="adj2" fmla="val 36829"/>
+            </a:avLst>
+          </a:prstGeom>
+          <a:solidFill>
+            <a:schemeClr val="tx1">
+              <a:lumMod val="50000"/>
+              <a:lumOff val="50000"/>
+            </a:schemeClr>
+          </a:solidFill>
+          <a:ln>
+            <a:noFill/>
+          </a:ln>
+        </p:spPr>
+        <p:style>
+          <a:lnRef idx="2">
+            <a:schemeClr val="accent1">
+              <a:shade val="50000"/>
+            </a:schemeClr>
+          </a:lnRef>
+          <a:fillRef idx="1">
+            <a:schemeClr val="accent1"/>
+          </a:fillRef>
+          <a:effectRef idx="0">
+            <a:schemeClr val="accent1"/>
+          </a:effectRef>
+          <a:fontRef idx="minor">
+            <a:schemeClr val="lt1"/>
+          </a:fontRef>
+        </p:style>
+        <p:txBody>
+          <a:bodyPr rtlCol="0" anchor="ctr"/>
+          <a:lstStyle/>
+          <a:p>
+            <a:pPr algn="ctr"/>
+            <a:endParaRPr lang="en-CH"/>
+          </a:p>
+        </p:txBody>
+      </p:sp>
+      <p:sp>
+        <p:nvSpPr>
+          <p:cNvPr id="202" name="TextBox 201">
+            <a:extLst>
+              <a:ext uri="{FF2B5EF4-FFF2-40B4-BE49-F238E27FC236}">
+                <a16:creationId xmlns:a16="http://schemas.microsoft.com/office/drawing/2014/main" id="{BEB5171C-143B-A34A-A9DD-C649DCF0A736}"/>
+              </a:ext>
+            </a:extLst>
+          </p:cNvPr>
+          <p:cNvSpPr txBox="1"/>
+          <p:nvPr/>
+        </p:nvSpPr>
+        <p:spPr>
+          <a:xfrm>
+            <a:off x="6701311" y="1220092"/>
+            <a:ext cx="639919" cy="338554"/>
+          </a:xfrm>
+          <a:prstGeom prst="rect">
+            <a:avLst/>
+          </a:prstGeom>
+          <a:noFill/>
+        </p:spPr>
+        <p:txBody>
+          <a:bodyPr wrap="none" rtlCol="0">
+            <a:spAutoFit/>
+          </a:bodyPr>
+          <a:lstStyle/>
+          <a:p>
+            <a:r>
+              <a:rPr lang="en-CH" sz="1600" b="1" dirty="0">
+                <a:solidFill>
+                  <a:schemeClr val="bg1"/>
+                </a:solidFill>
+                <a:latin typeface="Arial" panose="020B0604020202020204" pitchFamily="34" charset="0"/>
+                <a:ea typeface="Apple Color Emoji" pitchFamily="2" charset="0"/>
+                <a:cs typeface="Arial" panose="020B0604020202020204" pitchFamily="34" charset="0"/>
+              </a:rPr>
+              <a:t>DIFF</a:t>
+            </a:r>
+          </a:p>
+        </p:txBody>
+      </p:sp>
+      <p:sp>
+        <p:nvSpPr>
+          <p:cNvPr id="207" name="TextBox 206">
+            <a:extLst>
+              <a:ext uri="{FF2B5EF4-FFF2-40B4-BE49-F238E27FC236}">
+                <a16:creationId xmlns:a16="http://schemas.microsoft.com/office/drawing/2014/main" id="{47DF13BC-76D4-544E-B869-FE6FDF7333E3}"/>
+              </a:ext>
+            </a:extLst>
+          </p:cNvPr>
+          <p:cNvSpPr txBox="1"/>
+          <p:nvPr/>
+        </p:nvSpPr>
+        <p:spPr>
+          <a:xfrm>
+            <a:off x="5644120" y="1062491"/>
+            <a:ext cx="942822" cy="707886"/>
+          </a:xfrm>
+          <a:prstGeom prst="rect">
+            <a:avLst/>
+          </a:prstGeom>
+          <a:noFill/>
+        </p:spPr>
+        <p:txBody>
+          <a:bodyPr wrap="none" rtlCol="0">
+            <a:spAutoFit/>
+          </a:bodyPr>
+          <a:lstStyle/>
+          <a:p>
+            <a:r>
+              <a:rPr lang="en-CH" sz="4000" b="1" dirty="0">
+                <a:solidFill>
+                  <a:schemeClr val="tx2"/>
+                </a:solidFill>
+              </a:rPr>
+              <a:t>JAR</a:t>
+            </a:r>
+            <a:endParaRPr lang="en-CH" sz="7200" b="1" dirty="0">
+              <a:solidFill>
+                <a:schemeClr val="tx2"/>
+              </a:solidFill>
+            </a:endParaRPr>
+          </a:p>
+        </p:txBody>
+      </p:sp>
+      <p:sp>
+        <p:nvSpPr>
+          <p:cNvPr id="209" name="TextBox 208">
+            <a:extLst>
+              <a:ext uri="{FF2B5EF4-FFF2-40B4-BE49-F238E27FC236}">
+                <a16:creationId xmlns:a16="http://schemas.microsoft.com/office/drawing/2014/main" id="{DAA89F5B-02A6-1347-9537-E3B7D6685558}"/>
+              </a:ext>
+            </a:extLst>
+          </p:cNvPr>
+          <p:cNvSpPr txBox="1"/>
+          <p:nvPr/>
+        </p:nvSpPr>
+        <p:spPr>
+          <a:xfrm>
+            <a:off x="7490745" y="1055022"/>
+            <a:ext cx="942822" cy="707886"/>
+          </a:xfrm>
+          <a:prstGeom prst="rect">
+            <a:avLst/>
+          </a:prstGeom>
+          <a:noFill/>
+        </p:spPr>
+        <p:txBody>
+          <a:bodyPr wrap="none" rtlCol="0">
+            <a:spAutoFit/>
+          </a:bodyPr>
+          <a:lstStyle/>
+          <a:p>
+            <a:r>
+              <a:rPr lang="en-CH" sz="4000" b="1" dirty="0">
+                <a:solidFill>
+                  <a:schemeClr val="tx2"/>
+                </a:solidFill>
+              </a:rPr>
+              <a:t>JAR</a:t>
+            </a:r>
+            <a:endParaRPr lang="en-CH" sz="7200" b="1" dirty="0">
+              <a:solidFill>
+                <a:schemeClr val="tx2"/>
+              </a:solidFill>
+            </a:endParaRPr>
+          </a:p>
+        </p:txBody>
+      </p:sp>
     </p:spTree>
     <p:extLst>
       <p:ext uri="{BB962C8B-B14F-4D97-AF65-F5344CB8AC3E}">

</xml_diff>